<commit_message>
Documented notebook, corrected presentation
</commit_message>
<xml_diff>
--- a/P3_01_presentation.pptx
+++ b/P3_01_presentation.pptx
@@ -11,12 +11,17 @@
     <p:sldId id="259" r:id="rId5"/>
     <p:sldId id="260" r:id="rId6"/>
     <p:sldId id="261" r:id="rId7"/>
-    <p:sldId id="262" r:id="rId8"/>
-    <p:sldId id="263" r:id="rId9"/>
-    <p:sldId id="265" r:id="rId10"/>
-    <p:sldId id="264" r:id="rId11"/>
-    <p:sldId id="266" r:id="rId12"/>
-    <p:sldId id="267" r:id="rId13"/>
+    <p:sldId id="271" r:id="rId8"/>
+    <p:sldId id="262" r:id="rId9"/>
+    <p:sldId id="263" r:id="rId10"/>
+    <p:sldId id="265" r:id="rId11"/>
+    <p:sldId id="270" r:id="rId12"/>
+    <p:sldId id="272" r:id="rId13"/>
+    <p:sldId id="269" r:id="rId14"/>
+    <p:sldId id="264" r:id="rId15"/>
+    <p:sldId id="268" r:id="rId16"/>
+    <p:sldId id="266" r:id="rId17"/>
+    <p:sldId id="267" r:id="rId18"/>
   </p:sldIdLst>
   <p:sldSz cx="12192000" cy="6858000"/>
   <p:notesSz cx="6858000" cy="9144000"/>
@@ -299,7 +304,7 @@
           </a:lstStyle>
           <a:p>
             <a:r>
-              <a:rPr lang="en-US" smtClean="0"/>
+              <a:rPr lang="en-US"/>
               <a:t>Click to edit Master title style</a:t>
             </a:r>
             <a:endParaRPr lang="en-US" dirty="0"/>
@@ -419,7 +424,7 @@
           </a:lstStyle>
           <a:p>
             <a:r>
-              <a:rPr lang="en-US" smtClean="0"/>
+              <a:rPr lang="en-US"/>
               <a:t>Click to edit Master subtitle style</a:t>
             </a:r>
             <a:endParaRPr lang="en-US" dirty="0"/>
@@ -458,7 +463,7 @@
           <a:p>
             <a:fld id="{B35C6026-1E2D-41A2-8CE3-76544FD0B1C2}" type="datetimeFigureOut">
               <a:rPr lang="fr-FR" smtClean="0"/>
-              <a:t>09/02/2021</a:t>
+              <a:t>17/02/2021</a:t>
             </a:fld>
             <a:endParaRPr lang="fr-FR" dirty="0"/>
           </a:p>
@@ -556,7 +561,7 @@
           <a:p>
             <a:fld id="{75462682-1E11-49BB-B5A9-AF67021C5DDE}" type="slidenum">
               <a:rPr lang="fr-FR" smtClean="0"/>
-              <a:t>‹#›</a:t>
+              <a:t>‹N°›</a:t>
             </a:fld>
             <a:endParaRPr lang="fr-FR" dirty="0"/>
           </a:p>
@@ -1369,7 +1374,7 @@
           </a:lstStyle>
           <a:p>
             <a:r>
-              <a:rPr lang="en-US" smtClean="0"/>
+              <a:rPr lang="en-US"/>
               <a:t>Click to edit Master title style</a:t>
             </a:r>
             <a:endParaRPr lang="en-US" dirty="0"/>
@@ -1448,10 +1453,9 @@
           </a:lstStyle>
           <a:p>
             <a:r>
-              <a:rPr lang="en-US" dirty="0" smtClean="0"/>
+              <a:rPr lang="en-US" dirty="0"/>
               <a:t>Click icon to add picture</a:t>
             </a:r>
-            <a:endParaRPr lang="en-US" dirty="0"/>
           </a:p>
         </p:txBody>
       </p:sp>
@@ -1523,7 +1527,7 @@
           <a:p>
             <a:pPr lvl="0"/>
             <a:r>
-              <a:rPr lang="en-US" smtClean="0"/>
+              <a:rPr lang="en-US"/>
               <a:t>Click to edit Master text styles</a:t>
             </a:r>
           </a:p>
@@ -1546,7 +1550,7 @@
           <a:p>
             <a:fld id="{B35C6026-1E2D-41A2-8CE3-76544FD0B1C2}" type="datetimeFigureOut">
               <a:rPr lang="fr-FR" smtClean="0"/>
-              <a:t>09/02/2021</a:t>
+              <a:t>17/02/2021</a:t>
             </a:fld>
             <a:endParaRPr lang="fr-FR" dirty="0"/>
           </a:p>
@@ -1624,7 +1628,7 @@
           <a:p>
             <a:fld id="{75462682-1E11-49BB-B5A9-AF67021C5DDE}" type="slidenum">
               <a:rPr lang="fr-FR" smtClean="0"/>
-              <a:t>‹#›</a:t>
+              <a:t>‹N°›</a:t>
             </a:fld>
             <a:endParaRPr lang="fr-FR" dirty="0"/>
           </a:p>
@@ -2435,7 +2439,7 @@
           </a:lstStyle>
           <a:p>
             <a:r>
-              <a:rPr lang="en-US" smtClean="0"/>
+              <a:rPr lang="en-US"/>
               <a:t>Click to edit Master title style</a:t>
             </a:r>
             <a:endParaRPr lang="en-US" dirty="0"/>
@@ -2503,7 +2507,7 @@
           <a:p>
             <a:pPr lvl="0"/>
             <a:r>
-              <a:rPr lang="en-US" smtClean="0"/>
+              <a:rPr lang="en-US"/>
               <a:t>Click to edit Master text styles</a:t>
             </a:r>
           </a:p>
@@ -2526,7 +2530,7 @@
           <a:p>
             <a:fld id="{B35C6026-1E2D-41A2-8CE3-76544FD0B1C2}" type="datetimeFigureOut">
               <a:rPr lang="fr-FR" smtClean="0"/>
-              <a:t>09/02/2021</a:t>
+              <a:t>17/02/2021</a:t>
             </a:fld>
             <a:endParaRPr lang="fr-FR" dirty="0"/>
           </a:p>
@@ -2604,7 +2608,7 @@
           <a:p>
             <a:fld id="{75462682-1E11-49BB-B5A9-AF67021C5DDE}" type="slidenum">
               <a:rPr lang="fr-FR" smtClean="0"/>
-              <a:t>‹#›</a:t>
+              <a:t>‹N°›</a:t>
             </a:fld>
             <a:endParaRPr lang="fr-FR" dirty="0"/>
           </a:p>
@@ -3493,7 +3497,7 @@
           </a:lstStyle>
           <a:p>
             <a:r>
-              <a:rPr lang="en-US" smtClean="0"/>
+              <a:rPr lang="en-US"/>
               <a:t>Click to edit Master title style</a:t>
             </a:r>
             <a:endParaRPr lang="en-US" dirty="0"/>
@@ -3570,7 +3574,7 @@
           <a:p>
             <a:pPr lvl="0"/>
             <a:r>
-              <a:rPr lang="en-US" smtClean="0"/>
+              <a:rPr lang="en-US"/>
               <a:t>Click to edit Master text styles</a:t>
             </a:r>
           </a:p>
@@ -3637,7 +3641,7 @@
           <a:p>
             <a:pPr lvl="0"/>
             <a:r>
-              <a:rPr lang="en-US" smtClean="0"/>
+              <a:rPr lang="en-US"/>
               <a:t>Click to edit Master text styles</a:t>
             </a:r>
           </a:p>
@@ -3660,7 +3664,7 @@
           <a:p>
             <a:fld id="{B35C6026-1E2D-41A2-8CE3-76544FD0B1C2}" type="datetimeFigureOut">
               <a:rPr lang="fr-FR" smtClean="0"/>
-              <a:t>09/02/2021</a:t>
+              <a:t>17/02/2021</a:t>
             </a:fld>
             <a:endParaRPr lang="fr-FR" dirty="0"/>
           </a:p>
@@ -3738,7 +3742,7 @@
           <a:p>
             <a:fld id="{75462682-1E11-49BB-B5A9-AF67021C5DDE}" type="slidenum">
               <a:rPr lang="fr-FR" smtClean="0"/>
-              <a:t>‹#›</a:t>
+              <a:t>‹N°›</a:t>
             </a:fld>
             <a:endParaRPr lang="fr-FR" dirty="0"/>
           </a:p>
@@ -4549,7 +4553,7 @@
           </a:lstStyle>
           <a:p>
             <a:r>
-              <a:rPr lang="en-US" smtClean="0"/>
+              <a:rPr lang="en-US"/>
               <a:t>Click to edit Master title style</a:t>
             </a:r>
             <a:endParaRPr lang="en-US" dirty="0"/>
@@ -4670,7 +4674,7 @@
           <a:p>
             <a:pPr lvl="0"/>
             <a:r>
-              <a:rPr lang="en-US" smtClean="0"/>
+              <a:rPr lang="en-US"/>
               <a:t>Click to edit Master text styles</a:t>
             </a:r>
           </a:p>
@@ -4693,7 +4697,7 @@
           <a:p>
             <a:fld id="{B35C6026-1E2D-41A2-8CE3-76544FD0B1C2}" type="datetimeFigureOut">
               <a:rPr lang="fr-FR" smtClean="0"/>
-              <a:t>09/02/2021</a:t>
+              <a:t>17/02/2021</a:t>
             </a:fld>
             <a:endParaRPr lang="fr-FR" dirty="0"/>
           </a:p>
@@ -4771,7 +4775,7 @@
           <a:p>
             <a:fld id="{75462682-1E11-49BB-B5A9-AF67021C5DDE}" type="slidenum">
               <a:rPr lang="fr-FR" smtClean="0"/>
-              <a:t>‹#›</a:t>
+              <a:t>‹N°›</a:t>
             </a:fld>
             <a:endParaRPr lang="fr-FR" dirty="0"/>
           </a:p>
@@ -4832,7 +4836,7 @@
           </a:lstStyle>
           <a:p>
             <a:r>
-              <a:rPr lang="en-US" smtClean="0"/>
+              <a:rPr lang="en-US"/>
               <a:t>Click to edit Master title style</a:t>
             </a:r>
             <a:endParaRPr lang="en-US" dirty="0"/>
@@ -4907,7 +4911,7 @@
           <a:p>
             <a:pPr lvl="0"/>
             <a:r>
-              <a:rPr lang="en-US" smtClean="0"/>
+              <a:rPr lang="en-US"/>
               <a:t>Click to edit Master text styles</a:t>
             </a:r>
           </a:p>
@@ -4974,7 +4978,7 @@
           <a:p>
             <a:pPr lvl="0"/>
             <a:r>
-              <a:rPr lang="en-US" smtClean="0"/>
+              <a:rPr lang="en-US"/>
               <a:t>Click to edit Master text styles</a:t>
             </a:r>
           </a:p>
@@ -5048,7 +5052,7 @@
           <a:p>
             <a:pPr lvl="0"/>
             <a:r>
-              <a:rPr lang="en-US" smtClean="0"/>
+              <a:rPr lang="en-US"/>
               <a:t>Click to edit Master text styles</a:t>
             </a:r>
           </a:p>
@@ -5115,7 +5119,7 @@
           <a:p>
             <a:pPr lvl="0"/>
             <a:r>
-              <a:rPr lang="en-US" smtClean="0"/>
+              <a:rPr lang="en-US"/>
               <a:t>Click to edit Master text styles</a:t>
             </a:r>
           </a:p>
@@ -5189,7 +5193,7 @@
           <a:p>
             <a:pPr lvl="0"/>
             <a:r>
-              <a:rPr lang="en-US" smtClean="0"/>
+              <a:rPr lang="en-US"/>
               <a:t>Click to edit Master text styles</a:t>
             </a:r>
           </a:p>
@@ -5256,7 +5260,7 @@
           <a:p>
             <a:pPr lvl="0"/>
             <a:r>
-              <a:rPr lang="en-US" smtClean="0"/>
+              <a:rPr lang="en-US"/>
               <a:t>Click to edit Master text styles</a:t>
             </a:r>
           </a:p>
@@ -5353,7 +5357,7 @@
           <a:p>
             <a:fld id="{B35C6026-1E2D-41A2-8CE3-76544FD0B1C2}" type="datetimeFigureOut">
               <a:rPr lang="fr-FR" smtClean="0"/>
-              <a:t>09/02/2021</a:t>
+              <a:t>17/02/2021</a:t>
             </a:fld>
             <a:endParaRPr lang="fr-FR" dirty="0"/>
           </a:p>
@@ -5395,7 +5399,7 @@
           <a:p>
             <a:fld id="{75462682-1E11-49BB-B5A9-AF67021C5DDE}" type="slidenum">
               <a:rPr lang="fr-FR" smtClean="0"/>
-              <a:t>‹#›</a:t>
+              <a:t>‹N°›</a:t>
             </a:fld>
             <a:endParaRPr lang="fr-FR" dirty="0"/>
           </a:p>
@@ -5456,7 +5460,7 @@
           </a:lstStyle>
           <a:p>
             <a:r>
-              <a:rPr lang="en-US" smtClean="0"/>
+              <a:rPr lang="en-US"/>
               <a:t>Click to edit Master title style</a:t>
             </a:r>
             <a:endParaRPr lang="en-US" dirty="0"/>
@@ -5531,7 +5535,7 @@
           <a:p>
             <a:pPr lvl="0"/>
             <a:r>
-              <a:rPr lang="en-US" smtClean="0"/>
+              <a:rPr lang="en-US"/>
               <a:t>Click to edit Master text styles</a:t>
             </a:r>
           </a:p>
@@ -5609,10 +5613,9 @@
           </a:lstStyle>
           <a:p>
             <a:r>
-              <a:rPr lang="en-US" dirty="0" smtClean="0"/>
+              <a:rPr lang="en-US" dirty="0"/>
               <a:t>Click icon to add picture</a:t>
             </a:r>
-            <a:endParaRPr lang="en-US" dirty="0"/>
           </a:p>
         </p:txBody>
       </p:sp>
@@ -5677,7 +5680,7 @@
           <a:p>
             <a:pPr lvl="0"/>
             <a:r>
-              <a:rPr lang="en-US" smtClean="0"/>
+              <a:rPr lang="en-US"/>
               <a:t>Click to edit Master text styles</a:t>
             </a:r>
           </a:p>
@@ -5751,7 +5754,7 @@
           <a:p>
             <a:pPr lvl="0"/>
             <a:r>
-              <a:rPr lang="en-US" smtClean="0"/>
+              <a:rPr lang="en-US"/>
               <a:t>Click to edit Master text styles</a:t>
             </a:r>
           </a:p>
@@ -5829,10 +5832,9 @@
           </a:lstStyle>
           <a:p>
             <a:r>
-              <a:rPr lang="en-US" dirty="0" smtClean="0"/>
+              <a:rPr lang="en-US" dirty="0"/>
               <a:t>Click icon to add picture</a:t>
             </a:r>
-            <a:endParaRPr lang="en-US" dirty="0"/>
           </a:p>
         </p:txBody>
       </p:sp>
@@ -5897,7 +5899,7 @@
           <a:p>
             <a:pPr lvl="0"/>
             <a:r>
-              <a:rPr lang="en-US" smtClean="0"/>
+              <a:rPr lang="en-US"/>
               <a:t>Click to edit Master text styles</a:t>
             </a:r>
           </a:p>
@@ -5971,7 +5973,7 @@
           <a:p>
             <a:pPr lvl="0"/>
             <a:r>
-              <a:rPr lang="en-US" smtClean="0"/>
+              <a:rPr lang="en-US"/>
               <a:t>Click to edit Master text styles</a:t>
             </a:r>
           </a:p>
@@ -6049,10 +6051,9 @@
           </a:lstStyle>
           <a:p>
             <a:r>
-              <a:rPr lang="en-US" dirty="0" smtClean="0"/>
+              <a:rPr lang="en-US" dirty="0"/>
               <a:t>Click icon to add picture</a:t>
             </a:r>
-            <a:endParaRPr lang="en-US" dirty="0"/>
           </a:p>
         </p:txBody>
       </p:sp>
@@ -6117,7 +6118,7 @@
           <a:p>
             <a:pPr lvl="0"/>
             <a:r>
-              <a:rPr lang="en-US" smtClean="0"/>
+              <a:rPr lang="en-US"/>
               <a:t>Click to edit Master text styles</a:t>
             </a:r>
           </a:p>
@@ -6214,7 +6215,7 @@
           <a:p>
             <a:fld id="{B35C6026-1E2D-41A2-8CE3-76544FD0B1C2}" type="datetimeFigureOut">
               <a:rPr lang="fr-FR" smtClean="0"/>
-              <a:t>09/02/2021</a:t>
+              <a:t>17/02/2021</a:t>
             </a:fld>
             <a:endParaRPr lang="fr-FR" dirty="0"/>
           </a:p>
@@ -6261,7 +6262,7 @@
           <a:p>
             <a:fld id="{75462682-1E11-49BB-B5A9-AF67021C5DDE}" type="slidenum">
               <a:rPr lang="fr-FR" smtClean="0"/>
-              <a:t>‹#›</a:t>
+              <a:t>‹N°›</a:t>
             </a:fld>
             <a:endParaRPr lang="fr-FR" dirty="0"/>
           </a:p>
@@ -6318,7 +6319,7 @@
           <a:lstStyle/>
           <a:p>
             <a:r>
-              <a:rPr lang="en-US" smtClean="0"/>
+              <a:rPr lang="en-US"/>
               <a:t>Click to edit Master title style</a:t>
             </a:r>
             <a:endParaRPr lang="en-US" dirty="0"/>
@@ -6347,35 +6348,35 @@
           <a:p>
             <a:pPr lvl="0"/>
             <a:r>
-              <a:rPr lang="en-US" smtClean="0"/>
+              <a:rPr lang="en-US"/>
               <a:t>Click to edit Master text styles</a:t>
             </a:r>
           </a:p>
           <a:p>
             <a:pPr lvl="1"/>
             <a:r>
-              <a:rPr lang="en-US" smtClean="0"/>
+              <a:rPr lang="en-US"/>
               <a:t>Second level</a:t>
             </a:r>
           </a:p>
           <a:p>
             <a:pPr lvl="2"/>
             <a:r>
-              <a:rPr lang="en-US" smtClean="0"/>
+              <a:rPr lang="en-US"/>
               <a:t>Third level</a:t>
             </a:r>
           </a:p>
           <a:p>
             <a:pPr lvl="3"/>
             <a:r>
-              <a:rPr lang="en-US" smtClean="0"/>
+              <a:rPr lang="en-US"/>
               <a:t>Fourth level</a:t>
             </a:r>
           </a:p>
           <a:p>
             <a:pPr lvl="4"/>
             <a:r>
-              <a:rPr lang="en-US" smtClean="0"/>
+              <a:rPr lang="en-US"/>
               <a:t>Fifth level</a:t>
             </a:r>
             <a:endParaRPr lang="en-US" dirty="0"/>
@@ -6404,7 +6405,7 @@
           <a:p>
             <a:fld id="{B35C6026-1E2D-41A2-8CE3-76544FD0B1C2}" type="datetimeFigureOut">
               <a:rPr lang="fr-FR" smtClean="0"/>
-              <a:t>09/02/2021</a:t>
+              <a:t>17/02/2021</a:t>
             </a:fld>
             <a:endParaRPr lang="fr-FR" dirty="0"/>
           </a:p>
@@ -6446,7 +6447,7 @@
           <a:p>
             <a:fld id="{75462682-1E11-49BB-B5A9-AF67021C5DDE}" type="slidenum">
               <a:rPr lang="fr-FR" smtClean="0"/>
-              <a:t>‹#›</a:t>
+              <a:t>‹N°›</a:t>
             </a:fld>
             <a:endParaRPr lang="fr-FR" dirty="0"/>
           </a:p>
@@ -7290,7 +7291,7 @@
           <a:lstStyle/>
           <a:p>
             <a:r>
-              <a:rPr lang="en-US" smtClean="0"/>
+              <a:rPr lang="en-US"/>
               <a:t>Click to edit Master title style</a:t>
             </a:r>
             <a:endParaRPr lang="en-US" dirty="0"/>
@@ -7319,35 +7320,35 @@
           <a:p>
             <a:pPr lvl="0"/>
             <a:r>
-              <a:rPr lang="en-US" smtClean="0"/>
+              <a:rPr lang="en-US"/>
               <a:t>Click to edit Master text styles</a:t>
             </a:r>
           </a:p>
           <a:p>
             <a:pPr lvl="1"/>
             <a:r>
-              <a:rPr lang="en-US" smtClean="0"/>
+              <a:rPr lang="en-US"/>
               <a:t>Second level</a:t>
             </a:r>
           </a:p>
           <a:p>
             <a:pPr lvl="2"/>
             <a:r>
-              <a:rPr lang="en-US" smtClean="0"/>
+              <a:rPr lang="en-US"/>
               <a:t>Third level</a:t>
             </a:r>
           </a:p>
           <a:p>
             <a:pPr lvl="3"/>
             <a:r>
-              <a:rPr lang="en-US" smtClean="0"/>
+              <a:rPr lang="en-US"/>
               <a:t>Fourth level</a:t>
             </a:r>
           </a:p>
           <a:p>
             <a:pPr lvl="4"/>
             <a:r>
-              <a:rPr lang="en-US" smtClean="0"/>
+              <a:rPr lang="en-US"/>
               <a:t>Fifth level</a:t>
             </a:r>
             <a:endParaRPr lang="en-US" dirty="0"/>
@@ -7376,7 +7377,7 @@
           <a:p>
             <a:fld id="{B35C6026-1E2D-41A2-8CE3-76544FD0B1C2}" type="datetimeFigureOut">
               <a:rPr lang="fr-FR" smtClean="0"/>
-              <a:t>09/02/2021</a:t>
+              <a:t>17/02/2021</a:t>
             </a:fld>
             <a:endParaRPr lang="fr-FR" dirty="0"/>
           </a:p>
@@ -7454,7 +7455,7 @@
           <a:p>
             <a:fld id="{75462682-1E11-49BB-B5A9-AF67021C5DDE}" type="slidenum">
               <a:rPr lang="fr-FR" smtClean="0"/>
-              <a:t>‹#›</a:t>
+              <a:t>‹N°›</a:t>
             </a:fld>
             <a:endParaRPr lang="fr-FR" dirty="0"/>
           </a:p>
@@ -7506,7 +7507,7 @@
           <a:lstStyle/>
           <a:p>
             <a:r>
-              <a:rPr lang="en-US" smtClean="0"/>
+              <a:rPr lang="en-US"/>
               <a:t>Click to edit Master title style</a:t>
             </a:r>
             <a:endParaRPr lang="en-US" dirty="0"/>
@@ -7535,35 +7536,35 @@
           <a:p>
             <a:pPr lvl="0"/>
             <a:r>
-              <a:rPr lang="en-US" smtClean="0"/>
+              <a:rPr lang="en-US"/>
               <a:t>Click to edit Master text styles</a:t>
             </a:r>
           </a:p>
           <a:p>
             <a:pPr lvl="1"/>
             <a:r>
-              <a:rPr lang="en-US" smtClean="0"/>
+              <a:rPr lang="en-US"/>
               <a:t>Second level</a:t>
             </a:r>
           </a:p>
           <a:p>
             <a:pPr lvl="2"/>
             <a:r>
-              <a:rPr lang="en-US" smtClean="0"/>
+              <a:rPr lang="en-US"/>
               <a:t>Third level</a:t>
             </a:r>
           </a:p>
           <a:p>
             <a:pPr lvl="3"/>
             <a:r>
-              <a:rPr lang="en-US" smtClean="0"/>
+              <a:rPr lang="en-US"/>
               <a:t>Fourth level</a:t>
             </a:r>
           </a:p>
           <a:p>
             <a:pPr lvl="4"/>
             <a:r>
-              <a:rPr lang="en-US" smtClean="0"/>
+              <a:rPr lang="en-US"/>
               <a:t>Fifth level</a:t>
             </a:r>
             <a:endParaRPr lang="en-US" dirty="0"/>
@@ -7587,7 +7588,7 @@
           <a:p>
             <a:fld id="{B35C6026-1E2D-41A2-8CE3-76544FD0B1C2}" type="datetimeFigureOut">
               <a:rPr lang="fr-FR" smtClean="0"/>
-              <a:t>09/02/2021</a:t>
+              <a:t>17/02/2021</a:t>
             </a:fld>
             <a:endParaRPr lang="fr-FR" dirty="0"/>
           </a:p>
@@ -7629,7 +7630,7 @@
           <a:p>
             <a:fld id="{75462682-1E11-49BB-B5A9-AF67021C5DDE}" type="slidenum">
               <a:rPr lang="fr-FR" smtClean="0"/>
-              <a:t>‹#›</a:t>
+              <a:t>‹N°›</a:t>
             </a:fld>
             <a:endParaRPr lang="fr-FR" dirty="0"/>
           </a:p>
@@ -8477,7 +8478,7 @@
           </a:lstStyle>
           <a:p>
             <a:r>
-              <a:rPr lang="en-US" smtClean="0"/>
+              <a:rPr lang="en-US"/>
               <a:t>Click to edit Master title style</a:t>
             </a:r>
             <a:endParaRPr lang="en-US" dirty="0"/>
@@ -8598,7 +8599,7 @@
           <a:p>
             <a:pPr lvl="0"/>
             <a:r>
-              <a:rPr lang="en-US" smtClean="0"/>
+              <a:rPr lang="en-US"/>
               <a:t>Click to edit Master text styles</a:t>
             </a:r>
           </a:p>
@@ -8621,7 +8622,7 @@
           <a:p>
             <a:fld id="{B35C6026-1E2D-41A2-8CE3-76544FD0B1C2}" type="datetimeFigureOut">
               <a:rPr lang="fr-FR" smtClean="0"/>
-              <a:t>09/02/2021</a:t>
+              <a:t>17/02/2021</a:t>
             </a:fld>
             <a:endParaRPr lang="fr-FR" dirty="0"/>
           </a:p>
@@ -8699,7 +8700,7 @@
           <a:p>
             <a:fld id="{75462682-1E11-49BB-B5A9-AF67021C5DDE}" type="slidenum">
               <a:rPr lang="fr-FR" smtClean="0"/>
-              <a:t>‹#›</a:t>
+              <a:t>‹N°›</a:t>
             </a:fld>
             <a:endParaRPr lang="fr-FR" dirty="0"/>
           </a:p>
@@ -8751,7 +8752,7 @@
           <a:lstStyle/>
           <a:p>
             <a:r>
-              <a:rPr lang="en-US" smtClean="0"/>
+              <a:rPr lang="en-US"/>
               <a:t>Click to edit Master title style</a:t>
             </a:r>
             <a:endParaRPr lang="en-US" dirty="0"/>
@@ -8782,35 +8783,35 @@
           <a:p>
             <a:pPr lvl="0"/>
             <a:r>
-              <a:rPr lang="en-US" smtClean="0"/>
+              <a:rPr lang="en-US"/>
               <a:t>Click to edit Master text styles</a:t>
             </a:r>
           </a:p>
           <a:p>
             <a:pPr lvl="1"/>
             <a:r>
-              <a:rPr lang="en-US" smtClean="0"/>
+              <a:rPr lang="en-US"/>
               <a:t>Second level</a:t>
             </a:r>
           </a:p>
           <a:p>
             <a:pPr lvl="2"/>
             <a:r>
-              <a:rPr lang="en-US" smtClean="0"/>
+              <a:rPr lang="en-US"/>
               <a:t>Third level</a:t>
             </a:r>
           </a:p>
           <a:p>
             <a:pPr lvl="3"/>
             <a:r>
-              <a:rPr lang="en-US" smtClean="0"/>
+              <a:rPr lang="en-US"/>
               <a:t>Fourth level</a:t>
             </a:r>
           </a:p>
           <a:p>
             <a:pPr lvl="4"/>
             <a:r>
-              <a:rPr lang="en-US" smtClean="0"/>
+              <a:rPr lang="en-US"/>
               <a:t>Fifth level</a:t>
             </a:r>
             <a:endParaRPr lang="en-US" dirty="0"/>
@@ -8841,35 +8842,35 @@
           <a:p>
             <a:pPr lvl="0"/>
             <a:r>
-              <a:rPr lang="en-US" smtClean="0"/>
+              <a:rPr lang="en-US"/>
               <a:t>Click to edit Master text styles</a:t>
             </a:r>
           </a:p>
           <a:p>
             <a:pPr lvl="1"/>
             <a:r>
-              <a:rPr lang="en-US" smtClean="0"/>
+              <a:rPr lang="en-US"/>
               <a:t>Second level</a:t>
             </a:r>
           </a:p>
           <a:p>
             <a:pPr lvl="2"/>
             <a:r>
-              <a:rPr lang="en-US" smtClean="0"/>
+              <a:rPr lang="en-US"/>
               <a:t>Third level</a:t>
             </a:r>
           </a:p>
           <a:p>
             <a:pPr lvl="3"/>
             <a:r>
-              <a:rPr lang="en-US" smtClean="0"/>
+              <a:rPr lang="en-US"/>
               <a:t>Fourth level</a:t>
             </a:r>
           </a:p>
           <a:p>
             <a:pPr lvl="4"/>
             <a:r>
-              <a:rPr lang="en-US" smtClean="0"/>
+              <a:rPr lang="en-US"/>
               <a:t>Fifth level</a:t>
             </a:r>
             <a:endParaRPr lang="en-US" dirty="0"/>
@@ -8893,7 +8894,7 @@
           <a:p>
             <a:fld id="{B35C6026-1E2D-41A2-8CE3-76544FD0B1C2}" type="datetimeFigureOut">
               <a:rPr lang="fr-FR" smtClean="0"/>
-              <a:t>09/02/2021</a:t>
+              <a:t>17/02/2021</a:t>
             </a:fld>
             <a:endParaRPr lang="fr-FR" dirty="0"/>
           </a:p>
@@ -8935,7 +8936,7 @@
           <a:p>
             <a:fld id="{75462682-1E11-49BB-B5A9-AF67021C5DDE}" type="slidenum">
               <a:rPr lang="fr-FR" smtClean="0"/>
-              <a:t>‹#›</a:t>
+              <a:t>‹N°›</a:t>
             </a:fld>
             <a:endParaRPr lang="fr-FR" dirty="0"/>
           </a:p>
@@ -8991,7 +8992,7 @@
           </a:lstStyle>
           <a:p>
             <a:r>
-              <a:rPr lang="en-US" smtClean="0"/>
+              <a:rPr lang="en-US"/>
               <a:t>Click to edit Master title style</a:t>
             </a:r>
             <a:endParaRPr lang="en-US" dirty="0"/>
@@ -9063,7 +9064,7 @@
           <a:p>
             <a:pPr lvl="0"/>
             <a:r>
-              <a:rPr lang="en-US" smtClean="0"/>
+              <a:rPr lang="en-US"/>
               <a:t>Click to edit Master text styles</a:t>
             </a:r>
           </a:p>
@@ -9093,35 +9094,35 @@
           <a:p>
             <a:pPr lvl="0"/>
             <a:r>
-              <a:rPr lang="en-US" smtClean="0"/>
+              <a:rPr lang="en-US"/>
               <a:t>Click to edit Master text styles</a:t>
             </a:r>
           </a:p>
           <a:p>
             <a:pPr lvl="1"/>
             <a:r>
-              <a:rPr lang="en-US" smtClean="0"/>
+              <a:rPr lang="en-US"/>
               <a:t>Second level</a:t>
             </a:r>
           </a:p>
           <a:p>
             <a:pPr lvl="2"/>
             <a:r>
-              <a:rPr lang="en-US" smtClean="0"/>
+              <a:rPr lang="en-US"/>
               <a:t>Third level</a:t>
             </a:r>
           </a:p>
           <a:p>
             <a:pPr lvl="3"/>
             <a:r>
-              <a:rPr lang="en-US" smtClean="0"/>
+              <a:rPr lang="en-US"/>
               <a:t>Fourth level</a:t>
             </a:r>
           </a:p>
           <a:p>
             <a:pPr lvl="4"/>
             <a:r>
-              <a:rPr lang="en-US" smtClean="0"/>
+              <a:rPr lang="en-US"/>
               <a:t>Fifth level</a:t>
             </a:r>
             <a:endParaRPr lang="en-US" dirty="0"/>
@@ -9193,7 +9194,7 @@
           <a:p>
             <a:pPr lvl="0"/>
             <a:r>
-              <a:rPr lang="en-US" smtClean="0"/>
+              <a:rPr lang="en-US"/>
               <a:t>Click to edit Master text styles</a:t>
             </a:r>
           </a:p>
@@ -9251,35 +9252,35 @@
           <a:p>
             <a:pPr lvl="0"/>
             <a:r>
-              <a:rPr lang="en-US" smtClean="0"/>
+              <a:rPr lang="en-US"/>
               <a:t>Click to edit Master text styles</a:t>
             </a:r>
           </a:p>
           <a:p>
             <a:pPr lvl="1"/>
             <a:r>
-              <a:rPr lang="en-US" smtClean="0"/>
+              <a:rPr lang="en-US"/>
               <a:t>Second level</a:t>
             </a:r>
           </a:p>
           <a:p>
             <a:pPr lvl="2"/>
             <a:r>
-              <a:rPr lang="en-US" smtClean="0"/>
+              <a:rPr lang="en-US"/>
               <a:t>Third level</a:t>
             </a:r>
           </a:p>
           <a:p>
             <a:pPr lvl="3"/>
             <a:r>
-              <a:rPr lang="en-US" smtClean="0"/>
+              <a:rPr lang="en-US"/>
               <a:t>Fourth level</a:t>
             </a:r>
           </a:p>
           <a:p>
             <a:pPr lvl="4"/>
             <a:r>
-              <a:rPr lang="en-US" smtClean="0"/>
+              <a:rPr lang="en-US"/>
               <a:t>Fifth level</a:t>
             </a:r>
             <a:endParaRPr lang="en-US" dirty="0"/>
@@ -9303,7 +9304,7 @@
           <a:p>
             <a:fld id="{B35C6026-1E2D-41A2-8CE3-76544FD0B1C2}" type="datetimeFigureOut">
               <a:rPr lang="fr-FR" smtClean="0"/>
-              <a:t>09/02/2021</a:t>
+              <a:t>17/02/2021</a:t>
             </a:fld>
             <a:endParaRPr lang="fr-FR" dirty="0"/>
           </a:p>
@@ -9345,7 +9346,7 @@
           <a:p>
             <a:fld id="{75462682-1E11-49BB-B5A9-AF67021C5DDE}" type="slidenum">
               <a:rPr lang="fr-FR" smtClean="0"/>
-              <a:t>‹#›</a:t>
+              <a:t>‹N°›</a:t>
             </a:fld>
             <a:endParaRPr lang="fr-FR" dirty="0"/>
           </a:p>
@@ -9406,7 +9407,7 @@
           </a:lstStyle>
           <a:p>
             <a:r>
-              <a:rPr lang="en-US" smtClean="0"/>
+              <a:rPr lang="en-US"/>
               <a:t>Click to edit Master title style</a:t>
             </a:r>
             <a:endParaRPr lang="en-US" dirty="0"/>
@@ -9430,7 +9431,7 @@
           <a:p>
             <a:fld id="{B35C6026-1E2D-41A2-8CE3-76544FD0B1C2}" type="datetimeFigureOut">
               <a:rPr lang="fr-FR" smtClean="0"/>
-              <a:t>09/02/2021</a:t>
+              <a:t>17/02/2021</a:t>
             </a:fld>
             <a:endParaRPr lang="fr-FR" dirty="0"/>
           </a:p>
@@ -9472,7 +9473,7 @@
           <a:p>
             <a:fld id="{75462682-1E11-49BB-B5A9-AF67021C5DDE}" type="slidenum">
               <a:rPr lang="fr-FR" smtClean="0"/>
-              <a:t>‹#›</a:t>
+              <a:t>‹N°›</a:t>
             </a:fld>
             <a:endParaRPr lang="fr-FR" dirty="0"/>
           </a:p>
@@ -9525,7 +9526,7 @@
           <a:p>
             <a:fld id="{B35C6026-1E2D-41A2-8CE3-76544FD0B1C2}" type="datetimeFigureOut">
               <a:rPr lang="fr-FR" smtClean="0"/>
-              <a:t>09/02/2021</a:t>
+              <a:t>17/02/2021</a:t>
             </a:fld>
             <a:endParaRPr lang="fr-FR" dirty="0"/>
           </a:p>
@@ -9603,7 +9604,7 @@
           <a:p>
             <a:fld id="{75462682-1E11-49BB-B5A9-AF67021C5DDE}" type="slidenum">
               <a:rPr lang="fr-FR" smtClean="0"/>
-              <a:t>‹#›</a:t>
+              <a:t>‹N°›</a:t>
             </a:fld>
             <a:endParaRPr lang="fr-FR" dirty="0"/>
           </a:p>
@@ -10451,7 +10452,7 @@
           </a:lstStyle>
           <a:p>
             <a:r>
-              <a:rPr lang="en-US" smtClean="0"/>
+              <a:rPr lang="en-US"/>
               <a:t>Click to edit Master title style</a:t>
             </a:r>
             <a:endParaRPr lang="en-US" dirty="0"/>
@@ -10482,35 +10483,35 @@
           <a:p>
             <a:pPr lvl="0"/>
             <a:r>
-              <a:rPr lang="en-US" smtClean="0"/>
+              <a:rPr lang="en-US"/>
               <a:t>Click to edit Master text styles</a:t>
             </a:r>
           </a:p>
           <a:p>
             <a:pPr lvl="1"/>
             <a:r>
-              <a:rPr lang="en-US" smtClean="0"/>
+              <a:rPr lang="en-US"/>
               <a:t>Second level</a:t>
             </a:r>
           </a:p>
           <a:p>
             <a:pPr lvl="2"/>
             <a:r>
-              <a:rPr lang="en-US" smtClean="0"/>
+              <a:rPr lang="en-US"/>
               <a:t>Third level</a:t>
             </a:r>
           </a:p>
           <a:p>
             <a:pPr lvl="3"/>
             <a:r>
-              <a:rPr lang="en-US" smtClean="0"/>
+              <a:rPr lang="en-US"/>
               <a:t>Fourth level</a:t>
             </a:r>
           </a:p>
           <a:p>
             <a:pPr lvl="4"/>
             <a:r>
-              <a:rPr lang="en-US" smtClean="0"/>
+              <a:rPr lang="en-US"/>
               <a:t>Fifth level</a:t>
             </a:r>
             <a:endParaRPr lang="en-US" dirty="0"/>
@@ -10583,7 +10584,7 @@
           <a:p>
             <a:pPr lvl="0"/>
             <a:r>
-              <a:rPr lang="en-US" smtClean="0"/>
+              <a:rPr lang="en-US"/>
               <a:t>Click to edit Master text styles</a:t>
             </a:r>
           </a:p>
@@ -10606,7 +10607,7 @@
           <a:p>
             <a:fld id="{B35C6026-1E2D-41A2-8CE3-76544FD0B1C2}" type="datetimeFigureOut">
               <a:rPr lang="fr-FR" smtClean="0"/>
-              <a:t>09/02/2021</a:t>
+              <a:t>17/02/2021</a:t>
             </a:fld>
             <a:endParaRPr lang="fr-FR" dirty="0"/>
           </a:p>
@@ -10684,7 +10685,7 @@
           <a:p>
             <a:fld id="{75462682-1E11-49BB-B5A9-AF67021C5DDE}" type="slidenum">
               <a:rPr lang="fr-FR" smtClean="0"/>
-              <a:t>‹#›</a:t>
+              <a:t>‹N°›</a:t>
             </a:fld>
             <a:endParaRPr lang="fr-FR" dirty="0"/>
           </a:p>
@@ -11534,7 +11535,7 @@
           </a:lstStyle>
           <a:p>
             <a:r>
-              <a:rPr lang="en-US" smtClean="0"/>
+              <a:rPr lang="en-US"/>
               <a:t>Click to edit Master title style</a:t>
             </a:r>
             <a:endParaRPr lang="en-US" dirty="0"/>
@@ -11616,10 +11617,9 @@
               <a:buNone/>
             </a:pPr>
             <a:r>
-              <a:rPr lang="en-US" dirty="0" smtClean="0"/>
+              <a:rPr lang="en-US" dirty="0"/>
               <a:t>Click icon to add picture</a:t>
             </a:r>
-            <a:endParaRPr lang="en-US" dirty="0"/>
           </a:p>
         </p:txBody>
       </p:sp>
@@ -11691,7 +11691,7 @@
           <a:p>
             <a:pPr lvl="0"/>
             <a:r>
-              <a:rPr lang="en-US" smtClean="0"/>
+              <a:rPr lang="en-US"/>
               <a:t>Click to edit Master text styles</a:t>
             </a:r>
           </a:p>
@@ -11714,7 +11714,7 @@
           <a:p>
             <a:fld id="{B35C6026-1E2D-41A2-8CE3-76544FD0B1C2}" type="datetimeFigureOut">
               <a:rPr lang="fr-FR" smtClean="0"/>
-              <a:t>09/02/2021</a:t>
+              <a:t>17/02/2021</a:t>
             </a:fld>
             <a:endParaRPr lang="fr-FR" dirty="0"/>
           </a:p>
@@ -11792,7 +11792,7 @@
           <a:p>
             <a:fld id="{75462682-1E11-49BB-B5A9-AF67021C5DDE}" type="slidenum">
               <a:rPr lang="fr-FR" smtClean="0"/>
-              <a:t>‹#›</a:t>
+              <a:t>‹N°›</a:t>
             </a:fld>
             <a:endParaRPr lang="fr-FR" dirty="0"/>
           </a:p>
@@ -12609,7 +12609,7 @@
           <a:lstStyle/>
           <a:p>
             <a:r>
-              <a:rPr lang="en-US" smtClean="0"/>
+              <a:rPr lang="en-US"/>
               <a:t>Click to edit Master title style</a:t>
             </a:r>
             <a:endParaRPr lang="en-US" dirty="0"/>
@@ -12643,35 +12643,35 @@
           <a:p>
             <a:pPr lvl="0"/>
             <a:r>
-              <a:rPr lang="en-US" smtClean="0"/>
+              <a:rPr lang="en-US"/>
               <a:t>Click to edit Master text styles</a:t>
             </a:r>
           </a:p>
           <a:p>
             <a:pPr lvl="1"/>
             <a:r>
-              <a:rPr lang="en-US" smtClean="0"/>
+              <a:rPr lang="en-US"/>
               <a:t>Second level</a:t>
             </a:r>
           </a:p>
           <a:p>
             <a:pPr lvl="2"/>
             <a:r>
-              <a:rPr lang="en-US" smtClean="0"/>
+              <a:rPr lang="en-US"/>
               <a:t>Third level</a:t>
             </a:r>
           </a:p>
           <a:p>
             <a:pPr lvl="3"/>
             <a:r>
-              <a:rPr lang="en-US" smtClean="0"/>
+              <a:rPr lang="en-US"/>
               <a:t>Fourth level</a:t>
             </a:r>
           </a:p>
           <a:p>
             <a:pPr lvl="4"/>
             <a:r>
-              <a:rPr lang="en-US" smtClean="0"/>
+              <a:rPr lang="en-US"/>
               <a:t>Fifth level</a:t>
             </a:r>
             <a:endParaRPr lang="en-US" dirty="0"/>
@@ -12711,7 +12711,7 @@
           <a:p>
             <a:fld id="{B35C6026-1E2D-41A2-8CE3-76544FD0B1C2}" type="datetimeFigureOut">
               <a:rPr lang="fr-FR" smtClean="0"/>
-              <a:t>09/02/2021</a:t>
+              <a:t>17/02/2021</a:t>
             </a:fld>
             <a:endParaRPr lang="fr-FR" dirty="0"/>
           </a:p>
@@ -12821,7 +12821,7 @@
           <a:p>
             <a:fld id="{75462682-1E11-49BB-B5A9-AF67021C5DDE}" type="slidenum">
               <a:rPr lang="fr-FR" smtClean="0"/>
-              <a:t>‹#›</a:t>
+              <a:t>‹N°›</a:t>
             </a:fld>
             <a:endParaRPr lang="fr-FR" dirty="0"/>
           </a:p>
@@ -13312,10 +13312,9 @@
           <a:lstStyle/>
           <a:p>
             <a:r>
-              <a:rPr lang="fr-FR" dirty="0" smtClean="0"/>
+              <a:rPr lang="fr-FR" dirty="0"/>
               <a:t>Ingénieur IA – projet 3</a:t>
             </a:r>
-            <a:endParaRPr lang="fr-FR" dirty="0"/>
           </a:p>
         </p:txBody>
       </p:sp>
@@ -13329,13 +13328,6 @@
   <p:clrMapOvr>
     <a:masterClrMapping/>
   </p:clrMapOvr>
-  <p:timing>
-    <p:tnLst>
-      <p:par>
-        <p:cTn id="1" dur="indefinite" restart="never" nodeType="tmRoot"/>
-      </p:par>
-    </p:tnLst>
-  </p:timing>
 </p:sld>
 </file>
 
@@ -13366,27 +13358,57 @@
             <p:ph type="title"/>
           </p:nvPr>
         </p:nvSpPr>
+        <p:spPr/>
+        <p:txBody>
+          <a:bodyPr/>
+          <a:lstStyle/>
+          <a:p>
+            <a:r>
+              <a:rPr lang="fr-FR" dirty="0"/>
+              <a:t>Analyse en Composantes Principales</a:t>
+            </a:r>
+          </a:p>
+        </p:txBody>
+      </p:sp>
+      <p:sp>
+        <p:nvSpPr>
+          <p:cNvPr id="3" name="Content Placeholder 2"/>
+          <p:cNvSpPr>
+            <a:spLocks noGrp="1"/>
+          </p:cNvSpPr>
+          <p:nvPr>
+            <p:ph idx="1"/>
+          </p:nvPr>
+        </p:nvSpPr>
         <p:spPr>
           <a:xfrm>
-            <a:off x="2219479" y="925901"/>
-            <a:ext cx="8761413" cy="706964"/>
+            <a:off x="657649" y="6001792"/>
+            <a:ext cx="5191254" cy="856208"/>
           </a:xfrm>
         </p:spPr>
         <p:txBody>
           <a:bodyPr/>
           <a:lstStyle/>
           <a:p>
+            <a:pPr marL="0" indent="0">
+              <a:buNone/>
+            </a:pPr>
             <a:r>
-              <a:rPr lang="fr-FR" dirty="0" smtClean="0"/>
-              <a:t>ANOVA</a:t>
+              <a:rPr lang="fr-FR" dirty="0"/>
+              <a:t>III) ACP sur un nombre réduit de variables</a:t>
             </a:r>
+          </a:p>
+          <a:p>
+            <a:pPr marL="0" indent="0">
+              <a:buNone/>
+            </a:pPr>
             <a:endParaRPr lang="fr-FR" dirty="0"/>
           </a:p>
         </p:txBody>
       </p:sp>
       <p:pic>
         <p:nvPicPr>
-          <p:cNvPr id="6" name="Picture 5"/>
+          <p:cNvPr id="5" name="Picture 4"/>
           <p:cNvPicPr>
             <a:picLocks noChangeAspect="1"/>
           </p:cNvPicPr>
@@ -13400,8 +13422,8 @@
         </p:blipFill>
         <p:spPr>
           <a:xfrm>
-            <a:off x="527125" y="2271623"/>
-            <a:ext cx="3467100" cy="4038600"/>
+            <a:off x="5848903" y="1996366"/>
+            <a:ext cx="5417324" cy="4353801"/>
           </a:xfrm>
           <a:prstGeom prst="rect">
             <a:avLst/>
@@ -13410,7 +13432,7 @@
       </p:pic>
       <p:pic>
         <p:nvPicPr>
-          <p:cNvPr id="8" name="Picture 7"/>
+          <p:cNvPr id="6" name="Picture 5"/>
           <p:cNvPicPr>
             <a:picLocks noChangeAspect="1"/>
           </p:cNvPicPr>
@@ -13424,8 +13446,129 @@
         </p:blipFill>
         <p:spPr>
           <a:xfrm>
-            <a:off x="4115482" y="2252573"/>
-            <a:ext cx="3409950" cy="4057650"/>
+            <a:off x="358615" y="2276491"/>
+            <a:ext cx="5399058" cy="3607841"/>
+          </a:xfrm>
+          <a:prstGeom prst="rect">
+            <a:avLst/>
+          </a:prstGeom>
+        </p:spPr>
+      </p:pic>
+    </p:spTree>
+    <p:extLst>
+      <p:ext uri="{BB962C8B-B14F-4D97-AF65-F5344CB8AC3E}">
+        <p14:creationId xmlns:p14="http://schemas.microsoft.com/office/powerpoint/2010/main" val="1258370652"/>
+      </p:ext>
+    </p:extLst>
+  </p:cSld>
+  <p:clrMapOvr>
+    <a:masterClrMapping/>
+  </p:clrMapOvr>
+</p:sld>
+</file>
+
+<file path=ppt/slides/slide11.xml><?xml version="1.0" encoding="utf-8"?>
+<p:sld xmlns:a="http://schemas.openxmlformats.org/drawingml/2006/main" xmlns:r="http://schemas.openxmlformats.org/officeDocument/2006/relationships" xmlns:p="http://schemas.openxmlformats.org/presentationml/2006/main">
+  <p:cSld>
+    <p:spTree>
+      <p:nvGrpSpPr>
+        <p:cNvPr id="1" name=""/>
+        <p:cNvGrpSpPr/>
+        <p:nvPr/>
+      </p:nvGrpSpPr>
+      <p:grpSpPr>
+        <a:xfrm>
+          <a:off x="0" y="0"/>
+          <a:ext cx="0" cy="0"/>
+          <a:chOff x="0" y="0"/>
+          <a:chExt cx="0" cy="0"/>
+        </a:xfrm>
+      </p:grpSpPr>
+      <p:sp>
+        <p:nvSpPr>
+          <p:cNvPr id="2" name="Title 1"/>
+          <p:cNvSpPr>
+            <a:spLocks noGrp="1"/>
+          </p:cNvSpPr>
+          <p:nvPr>
+            <p:ph type="title"/>
+          </p:nvPr>
+        </p:nvSpPr>
+        <p:spPr>
+          <a:xfrm>
+            <a:off x="1039544" y="790385"/>
+            <a:ext cx="8761413" cy="706964"/>
+          </a:xfrm>
+        </p:spPr>
+        <p:txBody>
+          <a:bodyPr/>
+          <a:lstStyle/>
+          <a:p>
+            <a:r>
+              <a:rPr lang="fr-FR" dirty="0"/>
+              <a:t>Analyse en Composantes Principales</a:t>
+            </a:r>
+          </a:p>
+        </p:txBody>
+      </p:sp>
+      <p:sp>
+        <p:nvSpPr>
+          <p:cNvPr id="3" name="Content Placeholder 2"/>
+          <p:cNvSpPr>
+            <a:spLocks noGrp="1"/>
+          </p:cNvSpPr>
+          <p:nvPr>
+            <p:ph idx="1"/>
+          </p:nvPr>
+        </p:nvSpPr>
+        <p:spPr>
+          <a:xfrm>
+            <a:off x="1856134" y="1422702"/>
+            <a:ext cx="5191254" cy="856208"/>
+          </a:xfrm>
+        </p:spPr>
+        <p:txBody>
+          <a:bodyPr/>
+          <a:lstStyle/>
+          <a:p>
+            <a:pPr marL="0" indent="0">
+              <a:buNone/>
+            </a:pPr>
+            <a:r>
+              <a:rPr lang="fr-FR" dirty="0">
+                <a:solidFill>
+                  <a:schemeClr val="bg1"/>
+                </a:solidFill>
+              </a:rPr>
+              <a:t>IV) ACP minimaliste</a:t>
+            </a:r>
+          </a:p>
+        </p:txBody>
+      </p:sp>
+      <p:pic>
+        <p:nvPicPr>
+          <p:cNvPr id="7" name="Image 6">
+            <a:extLst>
+              <a:ext uri="{FF2B5EF4-FFF2-40B4-BE49-F238E27FC236}">
+                <a16:creationId xmlns:a16="http://schemas.microsoft.com/office/drawing/2014/main" id="{D7E5DD54-2AFC-43EE-9758-DD32951CB849}"/>
+              </a:ext>
+            </a:extLst>
+          </p:cNvPr>
+          <p:cNvPicPr>
+            <a:picLocks noChangeAspect="1"/>
+          </p:cNvPicPr>
+          <p:nvPr/>
+        </p:nvPicPr>
+        <p:blipFill>
+          <a:blip r:embed="rId2"/>
+          <a:stretch>
+            <a:fillRect/>
+          </a:stretch>
+        </p:blipFill>
+        <p:spPr>
+          <a:xfrm>
+            <a:off x="549467" y="1850806"/>
+            <a:ext cx="5093712" cy="4033526"/>
           </a:xfrm>
           <a:prstGeom prst="rect">
             <a:avLst/>
@@ -13434,7 +13577,368 @@
       </p:pic>
       <p:pic>
         <p:nvPicPr>
-          <p:cNvPr id="9" name="Picture 8"/>
+          <p:cNvPr id="9" name="Image 8">
+            <a:extLst>
+              <a:ext uri="{FF2B5EF4-FFF2-40B4-BE49-F238E27FC236}">
+                <a16:creationId xmlns:a16="http://schemas.microsoft.com/office/drawing/2014/main" id="{1778D1E4-C23D-4A9D-88A9-8CF7C8AA9FA4}"/>
+              </a:ext>
+            </a:extLst>
+          </p:cNvPr>
+          <p:cNvPicPr>
+            <a:picLocks noChangeAspect="1"/>
+          </p:cNvPicPr>
+          <p:nvPr/>
+        </p:nvPicPr>
+        <p:blipFill>
+          <a:blip r:embed="rId3"/>
+          <a:stretch>
+            <a:fillRect/>
+          </a:stretch>
+        </p:blipFill>
+        <p:spPr>
+          <a:xfrm>
+            <a:off x="5846712" y="2046115"/>
+            <a:ext cx="6026640" cy="4124353"/>
+          </a:xfrm>
+          <a:prstGeom prst="rect">
+            <a:avLst/>
+          </a:prstGeom>
+        </p:spPr>
+      </p:pic>
+    </p:spTree>
+    <p:extLst>
+      <p:ext uri="{BB962C8B-B14F-4D97-AF65-F5344CB8AC3E}">
+        <p14:creationId xmlns:p14="http://schemas.microsoft.com/office/powerpoint/2010/main" val="1104583659"/>
+      </p:ext>
+    </p:extLst>
+  </p:cSld>
+  <p:clrMapOvr>
+    <a:masterClrMapping/>
+  </p:clrMapOvr>
+</p:sld>
+</file>
+
+<file path=ppt/slides/slide12.xml><?xml version="1.0" encoding="utf-8"?>
+<p:sld xmlns:a="http://schemas.openxmlformats.org/drawingml/2006/main" xmlns:r="http://schemas.openxmlformats.org/officeDocument/2006/relationships" xmlns:p="http://schemas.openxmlformats.org/presentationml/2006/main">
+  <p:cSld>
+    <p:spTree>
+      <p:nvGrpSpPr>
+        <p:cNvPr id="1" name=""/>
+        <p:cNvGrpSpPr/>
+        <p:nvPr/>
+      </p:nvGrpSpPr>
+      <p:grpSpPr>
+        <a:xfrm>
+          <a:off x="0" y="0"/>
+          <a:ext cx="0" cy="0"/>
+          <a:chOff x="0" y="0"/>
+          <a:chExt cx="0" cy="0"/>
+        </a:xfrm>
+      </p:grpSpPr>
+      <p:sp>
+        <p:nvSpPr>
+          <p:cNvPr id="2" name="Titre 1">
+            <a:extLst>
+              <a:ext uri="{FF2B5EF4-FFF2-40B4-BE49-F238E27FC236}">
+                <a16:creationId xmlns:a16="http://schemas.microsoft.com/office/drawing/2014/main" id="{F1197A46-27F7-471F-906D-6F79D392948B}"/>
+              </a:ext>
+            </a:extLst>
+          </p:cNvPr>
+          <p:cNvSpPr>
+            <a:spLocks noGrp="1"/>
+          </p:cNvSpPr>
+          <p:nvPr>
+            <p:ph type="title"/>
+          </p:nvPr>
+        </p:nvSpPr>
+        <p:spPr/>
+        <p:txBody>
+          <a:bodyPr/>
+          <a:lstStyle/>
+          <a:p>
+            <a:r>
+              <a:rPr lang="fr-FR" dirty="0"/>
+              <a:t>ANOVA : Méthodologie</a:t>
+            </a:r>
+          </a:p>
+        </p:txBody>
+      </p:sp>
+      <p:pic>
+        <p:nvPicPr>
+          <p:cNvPr id="7" name="Image 6">
+            <a:extLst>
+              <a:ext uri="{FF2B5EF4-FFF2-40B4-BE49-F238E27FC236}">
+                <a16:creationId xmlns:a16="http://schemas.microsoft.com/office/drawing/2014/main" id="{48987028-FB22-4689-802A-3019ED1F8764}"/>
+              </a:ext>
+            </a:extLst>
+          </p:cNvPr>
+          <p:cNvPicPr>
+            <a:picLocks noChangeAspect="1"/>
+          </p:cNvPicPr>
+          <p:nvPr/>
+        </p:nvPicPr>
+        <p:blipFill>
+          <a:blip r:embed="rId2"/>
+          <a:stretch>
+            <a:fillRect/>
+          </a:stretch>
+        </p:blipFill>
+        <p:spPr>
+          <a:xfrm>
+            <a:off x="1300994" y="1897185"/>
+            <a:ext cx="9305925" cy="4714875"/>
+          </a:xfrm>
+          <a:prstGeom prst="rect">
+            <a:avLst/>
+          </a:prstGeom>
+        </p:spPr>
+      </p:pic>
+    </p:spTree>
+    <p:extLst>
+      <p:ext uri="{BB962C8B-B14F-4D97-AF65-F5344CB8AC3E}">
+        <p14:creationId xmlns:p14="http://schemas.microsoft.com/office/powerpoint/2010/main" val="2973557762"/>
+      </p:ext>
+    </p:extLst>
+  </p:cSld>
+  <p:clrMapOvr>
+    <a:masterClrMapping/>
+  </p:clrMapOvr>
+</p:sld>
+</file>
+
+<file path=ppt/slides/slide13.xml><?xml version="1.0" encoding="utf-8"?>
+<p:sld xmlns:a="http://schemas.openxmlformats.org/drawingml/2006/main" xmlns:r="http://schemas.openxmlformats.org/officeDocument/2006/relationships" xmlns:p="http://schemas.openxmlformats.org/presentationml/2006/main">
+  <p:cSld>
+    <p:spTree>
+      <p:nvGrpSpPr>
+        <p:cNvPr id="1" name=""/>
+        <p:cNvGrpSpPr/>
+        <p:nvPr/>
+      </p:nvGrpSpPr>
+      <p:grpSpPr>
+        <a:xfrm>
+          <a:off x="0" y="0"/>
+          <a:ext cx="0" cy="0"/>
+          <a:chOff x="0" y="0"/>
+          <a:chExt cx="0" cy="0"/>
+        </a:xfrm>
+      </p:grpSpPr>
+      <p:sp>
+        <p:nvSpPr>
+          <p:cNvPr id="2" name="Title 1"/>
+          <p:cNvSpPr>
+            <a:spLocks noGrp="1"/>
+          </p:cNvSpPr>
+          <p:nvPr>
+            <p:ph type="title"/>
+          </p:nvPr>
+        </p:nvSpPr>
+        <p:spPr>
+          <a:xfrm>
+            <a:off x="6596585" y="970290"/>
+            <a:ext cx="5595415" cy="706964"/>
+          </a:xfrm>
+        </p:spPr>
+        <p:txBody>
+          <a:bodyPr/>
+          <a:lstStyle/>
+          <a:p>
+            <a:r>
+              <a:rPr lang="fr-FR" dirty="0"/>
+              <a:t>ANOVA </a:t>
+            </a:r>
+            <a:br>
+              <a:rPr lang="fr-FR" dirty="0"/>
+            </a:br>
+            <a:r>
+              <a:rPr lang="fr-FR" dirty="0"/>
+              <a:t>Energie et </a:t>
+            </a:r>
+            <a:r>
+              <a:rPr lang="fr-FR" dirty="0" err="1"/>
+              <a:t>Nutrigrade</a:t>
+            </a:r>
+            <a:endParaRPr lang="fr-FR" dirty="0"/>
+          </a:p>
+        </p:txBody>
+      </p:sp>
+      <p:pic>
+        <p:nvPicPr>
+          <p:cNvPr id="4" name="Image 3">
+            <a:extLst>
+              <a:ext uri="{FF2B5EF4-FFF2-40B4-BE49-F238E27FC236}">
+                <a16:creationId xmlns:a16="http://schemas.microsoft.com/office/drawing/2014/main" id="{C8B1D83E-99BB-498E-9968-D31969D9721B}"/>
+              </a:ext>
+            </a:extLst>
+          </p:cNvPr>
+          <p:cNvPicPr>
+            <a:picLocks noChangeAspect="1"/>
+          </p:cNvPicPr>
+          <p:nvPr/>
+        </p:nvPicPr>
+        <p:blipFill>
+          <a:blip r:embed="rId2"/>
+          <a:stretch>
+            <a:fillRect/>
+          </a:stretch>
+        </p:blipFill>
+        <p:spPr>
+          <a:xfrm>
+            <a:off x="459372" y="461962"/>
+            <a:ext cx="5857875" cy="5934075"/>
+          </a:xfrm>
+          <a:prstGeom prst="rect">
+            <a:avLst/>
+          </a:prstGeom>
+        </p:spPr>
+      </p:pic>
+      <p:sp>
+        <p:nvSpPr>
+          <p:cNvPr id="10" name="ZoneTexte 9">
+            <a:extLst>
+              <a:ext uri="{FF2B5EF4-FFF2-40B4-BE49-F238E27FC236}">
+                <a16:creationId xmlns:a16="http://schemas.microsoft.com/office/drawing/2014/main" id="{DC29BE35-AF9C-45A5-8996-541B22BDED07}"/>
+              </a:ext>
+            </a:extLst>
+          </p:cNvPr>
+          <p:cNvSpPr txBox="1"/>
+          <p:nvPr/>
+        </p:nvSpPr>
+        <p:spPr>
+          <a:xfrm>
+            <a:off x="6317247" y="3101394"/>
+            <a:ext cx="4909351" cy="1384995"/>
+          </a:xfrm>
+          <a:prstGeom prst="rect">
+            <a:avLst/>
+          </a:prstGeom>
+          <a:noFill/>
+        </p:spPr>
+        <p:txBody>
+          <a:bodyPr wrap="square" rtlCol="0">
+            <a:spAutoFit/>
+          </a:bodyPr>
+          <a:lstStyle/>
+          <a:p>
+            <a:pPr algn="l"/>
+            <a:r>
+              <a:rPr lang="fr-FR" sz="1400" b="0" i="0" dirty="0">
+                <a:solidFill>
+                  <a:srgbClr val="000000"/>
+                </a:solidFill>
+                <a:effectLst/>
+                <a:latin typeface="Helvetica Neue"/>
+              </a:rPr>
+              <a:t>Hypothèse nulle h0: Il n'y a pas de variation du taux moyen énergétique pour les différents </a:t>
+            </a:r>
+            <a:r>
+              <a:rPr lang="fr-FR" sz="1400" b="0" i="0" dirty="0" err="1">
+                <a:solidFill>
+                  <a:srgbClr val="000000"/>
+                </a:solidFill>
+                <a:effectLst/>
+                <a:latin typeface="Helvetica Neue"/>
+              </a:rPr>
+              <a:t>nutrigrades</a:t>
+            </a:r>
+            <a:r>
+              <a:rPr lang="fr-FR" sz="1400" b="0" i="0" dirty="0">
+                <a:solidFill>
+                  <a:srgbClr val="000000"/>
+                </a:solidFill>
+                <a:effectLst/>
+                <a:latin typeface="Helvetica Neue"/>
+              </a:rPr>
+              <a:t>.</a:t>
+            </a:r>
+          </a:p>
+          <a:p>
+            <a:pPr algn="l"/>
+            <a:endParaRPr lang="fr-FR" sz="1400" b="0" i="0" dirty="0">
+              <a:solidFill>
+                <a:srgbClr val="000000"/>
+              </a:solidFill>
+              <a:effectLst/>
+              <a:latin typeface="Helvetica Neue"/>
+            </a:endParaRPr>
+          </a:p>
+          <a:p>
+            <a:pPr algn="l"/>
+            <a:r>
+              <a:rPr lang="fr-FR" sz="1400" b="0" i="0" dirty="0">
+                <a:solidFill>
+                  <a:srgbClr val="000000"/>
+                </a:solidFill>
+                <a:effectLst/>
+                <a:latin typeface="Helvetica Neue"/>
+              </a:rPr>
+              <a:t>Hypothèse alternative: Il y a une variation du taux moyen énergétique pour les différents </a:t>
+            </a:r>
+            <a:r>
+              <a:rPr lang="fr-FR" sz="1400" b="0" i="0" dirty="0" err="1">
+                <a:solidFill>
+                  <a:srgbClr val="000000"/>
+                </a:solidFill>
+                <a:effectLst/>
+                <a:latin typeface="Helvetica Neue"/>
+              </a:rPr>
+              <a:t>nutrigrades</a:t>
+            </a:r>
+            <a:r>
+              <a:rPr lang="fr-FR" sz="1400" b="0" i="0" dirty="0">
+                <a:solidFill>
+                  <a:srgbClr val="000000"/>
+                </a:solidFill>
+                <a:effectLst/>
+                <a:latin typeface="Helvetica Neue"/>
+              </a:rPr>
+              <a:t>.</a:t>
+            </a:r>
+          </a:p>
+          <a:p>
+            <a:endParaRPr lang="fr-FR" sz="1400" dirty="0"/>
+          </a:p>
+        </p:txBody>
+      </p:sp>
+      <p:pic>
+        <p:nvPicPr>
+          <p:cNvPr id="12" name="Image 11">
+            <a:extLst>
+              <a:ext uri="{FF2B5EF4-FFF2-40B4-BE49-F238E27FC236}">
+                <a16:creationId xmlns:a16="http://schemas.microsoft.com/office/drawing/2014/main" id="{2A599E2A-3642-44B2-936F-3B3448BE3A36}"/>
+              </a:ext>
+            </a:extLst>
+          </p:cNvPr>
+          <p:cNvPicPr>
+            <a:picLocks noChangeAspect="1"/>
+          </p:cNvPicPr>
+          <p:nvPr/>
+        </p:nvPicPr>
+        <p:blipFill>
+          <a:blip r:embed="rId3"/>
+          <a:stretch>
+            <a:fillRect/>
+          </a:stretch>
+        </p:blipFill>
+        <p:spPr>
+          <a:xfrm>
+            <a:off x="6356597" y="2280103"/>
+            <a:ext cx="5362575" cy="714375"/>
+          </a:xfrm>
+          <a:prstGeom prst="rect">
+            <a:avLst/>
+          </a:prstGeom>
+        </p:spPr>
+      </p:pic>
+      <p:pic>
+        <p:nvPicPr>
+          <p:cNvPr id="14" name="Image 13">
+            <a:extLst>
+              <a:ext uri="{FF2B5EF4-FFF2-40B4-BE49-F238E27FC236}">
+                <a16:creationId xmlns:a16="http://schemas.microsoft.com/office/drawing/2014/main" id="{F22005E9-A103-4301-BE0F-5E279B5E2A7B}"/>
+              </a:ext>
+            </a:extLst>
+          </p:cNvPr>
           <p:cNvPicPr>
             <a:picLocks noChangeAspect="1"/>
           </p:cNvPicPr>
@@ -13448,8 +13952,355 @@
         </p:blipFill>
         <p:spPr>
           <a:xfrm>
-            <a:off x="7944926" y="2354214"/>
-            <a:ext cx="3381375" cy="4038600"/>
+            <a:off x="7376510" y="4593305"/>
+            <a:ext cx="2790825" cy="752475"/>
+          </a:xfrm>
+          <a:prstGeom prst="rect">
+            <a:avLst/>
+          </a:prstGeom>
+        </p:spPr>
+      </p:pic>
+    </p:spTree>
+    <p:extLst>
+      <p:ext uri="{BB962C8B-B14F-4D97-AF65-F5344CB8AC3E}">
+        <p14:creationId xmlns:p14="http://schemas.microsoft.com/office/powerpoint/2010/main" val="2122650708"/>
+      </p:ext>
+    </p:extLst>
+  </p:cSld>
+  <p:clrMapOvr>
+    <a:masterClrMapping/>
+  </p:clrMapOvr>
+</p:sld>
+</file>
+
+<file path=ppt/slides/slide14.xml><?xml version="1.0" encoding="utf-8"?>
+<p:sld xmlns:a="http://schemas.openxmlformats.org/drawingml/2006/main" xmlns:r="http://schemas.openxmlformats.org/officeDocument/2006/relationships" xmlns:p="http://schemas.openxmlformats.org/presentationml/2006/main">
+  <p:cSld>
+    <p:spTree>
+      <p:nvGrpSpPr>
+        <p:cNvPr id="1" name=""/>
+        <p:cNvGrpSpPr/>
+        <p:nvPr/>
+      </p:nvGrpSpPr>
+      <p:grpSpPr>
+        <a:xfrm>
+          <a:off x="0" y="0"/>
+          <a:ext cx="0" cy="0"/>
+          <a:chOff x="0" y="0"/>
+          <a:chExt cx="0" cy="0"/>
+        </a:xfrm>
+      </p:grpSpPr>
+      <p:pic>
+        <p:nvPicPr>
+          <p:cNvPr id="4" name="Image 3">
+            <a:extLst>
+              <a:ext uri="{FF2B5EF4-FFF2-40B4-BE49-F238E27FC236}">
+                <a16:creationId xmlns:a16="http://schemas.microsoft.com/office/drawing/2014/main" id="{3E7AE97B-AAE0-44EB-9678-64579390088E}"/>
+              </a:ext>
+            </a:extLst>
+          </p:cNvPr>
+          <p:cNvPicPr>
+            <a:picLocks noChangeAspect="1"/>
+          </p:cNvPicPr>
+          <p:nvPr/>
+        </p:nvPicPr>
+        <p:blipFill>
+          <a:blip r:embed="rId2"/>
+          <a:stretch>
+            <a:fillRect/>
+          </a:stretch>
+        </p:blipFill>
+        <p:spPr>
+          <a:xfrm>
+            <a:off x="64039" y="414337"/>
+            <a:ext cx="6257925" cy="6029325"/>
+          </a:xfrm>
+          <a:prstGeom prst="rect">
+            <a:avLst/>
+          </a:prstGeom>
+        </p:spPr>
+      </p:pic>
+      <p:sp>
+        <p:nvSpPr>
+          <p:cNvPr id="10" name="Title 1">
+            <a:extLst>
+              <a:ext uri="{FF2B5EF4-FFF2-40B4-BE49-F238E27FC236}">
+                <a16:creationId xmlns:a16="http://schemas.microsoft.com/office/drawing/2014/main" id="{85BF9445-ABEA-406B-8AED-5A001594CAD8}"/>
+              </a:ext>
+            </a:extLst>
+          </p:cNvPr>
+          <p:cNvSpPr txBox="1">
+            <a:spLocks/>
+          </p:cNvSpPr>
+          <p:nvPr/>
+        </p:nvSpPr>
+        <p:spPr bwMode="gray">
+          <a:xfrm>
+            <a:off x="6419032" y="961413"/>
+            <a:ext cx="5595415" cy="706964"/>
+          </a:xfrm>
+          <a:prstGeom prst="rect">
+            <a:avLst/>
+          </a:prstGeom>
+        </p:spPr>
+        <p:txBody>
+          <a:bodyPr vert="horz" lIns="91440" tIns="45720" rIns="91440" bIns="45720" rtlCol="0" anchor="ctr">
+            <a:noAutofit/>
+          </a:bodyPr>
+          <a:lstStyle>
+            <a:lvl1pPr algn="l" defTabSz="457200" rtl="0" eaLnBrk="1" latinLnBrk="0" hangingPunct="1">
+              <a:spcBef>
+                <a:spcPct val="0"/>
+              </a:spcBef>
+              <a:buNone/>
+              <a:defRPr sz="3600" b="0" i="0" kern="1200">
+                <a:solidFill>
+                  <a:schemeClr val="bg2"/>
+                </a:solidFill>
+                <a:latin typeface="+mj-lt"/>
+                <a:ea typeface="+mj-ea"/>
+                <a:cs typeface="+mj-cs"/>
+              </a:defRPr>
+            </a:lvl1pPr>
+            <a:lvl2pPr eaLnBrk="1" hangingPunct="1">
+              <a:defRPr>
+                <a:solidFill>
+                  <a:schemeClr val="tx2"/>
+                </a:solidFill>
+              </a:defRPr>
+            </a:lvl2pPr>
+            <a:lvl3pPr eaLnBrk="1" hangingPunct="1">
+              <a:defRPr>
+                <a:solidFill>
+                  <a:schemeClr val="tx2"/>
+                </a:solidFill>
+              </a:defRPr>
+            </a:lvl3pPr>
+            <a:lvl4pPr eaLnBrk="1" hangingPunct="1">
+              <a:defRPr>
+                <a:solidFill>
+                  <a:schemeClr val="tx2"/>
+                </a:solidFill>
+              </a:defRPr>
+            </a:lvl4pPr>
+            <a:lvl5pPr eaLnBrk="1" hangingPunct="1">
+              <a:defRPr>
+                <a:solidFill>
+                  <a:schemeClr val="tx2"/>
+                </a:solidFill>
+              </a:defRPr>
+            </a:lvl5pPr>
+            <a:lvl6pPr eaLnBrk="1" hangingPunct="1">
+              <a:defRPr>
+                <a:solidFill>
+                  <a:schemeClr val="tx2"/>
+                </a:solidFill>
+              </a:defRPr>
+            </a:lvl6pPr>
+            <a:lvl7pPr eaLnBrk="1" hangingPunct="1">
+              <a:defRPr>
+                <a:solidFill>
+                  <a:schemeClr val="tx2"/>
+                </a:solidFill>
+              </a:defRPr>
+            </a:lvl7pPr>
+            <a:lvl8pPr eaLnBrk="1" hangingPunct="1">
+              <a:defRPr>
+                <a:solidFill>
+                  <a:schemeClr val="tx2"/>
+                </a:solidFill>
+              </a:defRPr>
+            </a:lvl8pPr>
+            <a:lvl9pPr eaLnBrk="1" hangingPunct="1">
+              <a:defRPr>
+                <a:solidFill>
+                  <a:schemeClr val="tx2"/>
+                </a:solidFill>
+              </a:defRPr>
+            </a:lvl9pPr>
+          </a:lstStyle>
+          <a:p>
+            <a:r>
+              <a:rPr lang="fr-FR" dirty="0"/>
+              <a:t>ANOVA </a:t>
+            </a:r>
+            <a:br>
+              <a:rPr lang="fr-FR" dirty="0"/>
+            </a:br>
+            <a:r>
+              <a:rPr lang="fr-FR" dirty="0"/>
+              <a:t>Glucides et </a:t>
+            </a:r>
+            <a:r>
+              <a:rPr lang="fr-FR" dirty="0" err="1"/>
+              <a:t>Nutrigrade</a:t>
+            </a:r>
+            <a:endParaRPr lang="fr-FR" dirty="0"/>
+          </a:p>
+        </p:txBody>
+      </p:sp>
+      <p:pic>
+        <p:nvPicPr>
+          <p:cNvPr id="12" name="Image 11">
+            <a:extLst>
+              <a:ext uri="{FF2B5EF4-FFF2-40B4-BE49-F238E27FC236}">
+                <a16:creationId xmlns:a16="http://schemas.microsoft.com/office/drawing/2014/main" id="{98E8420E-81EC-4DC8-BE35-B2087FC817D6}"/>
+              </a:ext>
+            </a:extLst>
+          </p:cNvPr>
+          <p:cNvPicPr>
+            <a:picLocks noChangeAspect="1"/>
+          </p:cNvPicPr>
+          <p:nvPr/>
+        </p:nvPicPr>
+        <p:blipFill>
+          <a:blip r:embed="rId3"/>
+          <a:stretch>
+            <a:fillRect/>
+          </a:stretch>
+        </p:blipFill>
+        <p:spPr>
+          <a:xfrm>
+            <a:off x="6393462" y="2242952"/>
+            <a:ext cx="5381625" cy="809625"/>
+          </a:xfrm>
+          <a:prstGeom prst="rect">
+            <a:avLst/>
+          </a:prstGeom>
+        </p:spPr>
+      </p:pic>
+      <p:sp>
+        <p:nvSpPr>
+          <p:cNvPr id="13" name="ZoneTexte 12">
+            <a:extLst>
+              <a:ext uri="{FF2B5EF4-FFF2-40B4-BE49-F238E27FC236}">
+                <a16:creationId xmlns:a16="http://schemas.microsoft.com/office/drawing/2014/main" id="{8892B381-CB13-48B4-86AA-DBAAA4E74069}"/>
+              </a:ext>
+            </a:extLst>
+          </p:cNvPr>
+          <p:cNvSpPr txBox="1"/>
+          <p:nvPr/>
+        </p:nvSpPr>
+        <p:spPr>
+          <a:xfrm>
+            <a:off x="6317247" y="3101394"/>
+            <a:ext cx="4909351" cy="1384995"/>
+          </a:xfrm>
+          <a:prstGeom prst="rect">
+            <a:avLst/>
+          </a:prstGeom>
+          <a:noFill/>
+        </p:spPr>
+        <p:txBody>
+          <a:bodyPr wrap="square" rtlCol="0">
+            <a:spAutoFit/>
+          </a:bodyPr>
+          <a:lstStyle/>
+          <a:p>
+            <a:pPr algn="l"/>
+            <a:r>
+              <a:rPr lang="fr-FR" sz="1400" b="0" i="0" dirty="0">
+                <a:solidFill>
+                  <a:srgbClr val="000000"/>
+                </a:solidFill>
+                <a:effectLst/>
+                <a:latin typeface="Helvetica Neue"/>
+              </a:rPr>
+              <a:t>Hypothèse nulle h0: Il n'y a pas de variation du taux moyen de glucides pour les différents </a:t>
+            </a:r>
+            <a:r>
+              <a:rPr lang="fr-FR" sz="1400" b="0" i="0" dirty="0" err="1">
+                <a:solidFill>
+                  <a:srgbClr val="000000"/>
+                </a:solidFill>
+                <a:effectLst/>
+                <a:latin typeface="Helvetica Neue"/>
+              </a:rPr>
+              <a:t>nutrigrades</a:t>
+            </a:r>
+            <a:r>
+              <a:rPr lang="fr-FR" sz="1400" b="0" i="0" dirty="0">
+                <a:solidFill>
+                  <a:srgbClr val="000000"/>
+                </a:solidFill>
+                <a:effectLst/>
+                <a:latin typeface="Helvetica Neue"/>
+              </a:rPr>
+              <a:t>.</a:t>
+            </a:r>
+          </a:p>
+          <a:p>
+            <a:pPr algn="l"/>
+            <a:endParaRPr lang="fr-FR" sz="1400" b="0" i="0" dirty="0">
+              <a:solidFill>
+                <a:srgbClr val="000000"/>
+              </a:solidFill>
+              <a:effectLst/>
+              <a:latin typeface="Helvetica Neue"/>
+            </a:endParaRPr>
+          </a:p>
+          <a:p>
+            <a:pPr algn="l"/>
+            <a:r>
+              <a:rPr lang="fr-FR" sz="1400" b="0" i="0" dirty="0">
+                <a:solidFill>
+                  <a:srgbClr val="000000"/>
+                </a:solidFill>
+                <a:effectLst/>
+                <a:latin typeface="Helvetica Neue"/>
+              </a:rPr>
+              <a:t>Hypothèse alternative: Il y a une variation du taux moyen de glucides pour les différents </a:t>
+            </a:r>
+            <a:r>
+              <a:rPr lang="fr-FR" sz="1400" b="0" i="0" dirty="0" err="1">
+                <a:solidFill>
+                  <a:srgbClr val="000000"/>
+                </a:solidFill>
+                <a:effectLst/>
+                <a:latin typeface="Helvetica Neue"/>
+              </a:rPr>
+              <a:t>nutrigrades</a:t>
+            </a:r>
+            <a:r>
+              <a:rPr lang="fr-FR" sz="1400" b="0" i="0" dirty="0">
+                <a:solidFill>
+                  <a:srgbClr val="000000"/>
+                </a:solidFill>
+                <a:effectLst/>
+                <a:latin typeface="Helvetica Neue"/>
+              </a:rPr>
+              <a:t>.</a:t>
+            </a:r>
+          </a:p>
+          <a:p>
+            <a:endParaRPr lang="fr-FR" sz="1400" dirty="0"/>
+          </a:p>
+        </p:txBody>
+      </p:sp>
+      <p:pic>
+        <p:nvPicPr>
+          <p:cNvPr id="15" name="Image 14">
+            <a:extLst>
+              <a:ext uri="{FF2B5EF4-FFF2-40B4-BE49-F238E27FC236}">
+                <a16:creationId xmlns:a16="http://schemas.microsoft.com/office/drawing/2014/main" id="{AC7A6D9F-1164-44BF-89D1-77E6157C5445}"/>
+              </a:ext>
+            </a:extLst>
+          </p:cNvPr>
+          <p:cNvPicPr>
+            <a:picLocks noChangeAspect="1"/>
+          </p:cNvPicPr>
+          <p:nvPr/>
+        </p:nvPicPr>
+        <p:blipFill>
+          <a:blip r:embed="rId4"/>
+          <a:stretch>
+            <a:fillRect/>
+          </a:stretch>
+        </p:blipFill>
+        <p:spPr>
+          <a:xfrm>
+            <a:off x="7688861" y="4535206"/>
+            <a:ext cx="2790825" cy="676275"/>
           </a:xfrm>
           <a:prstGeom prst="rect">
             <a:avLst/>
@@ -13466,17 +14317,357 @@
   <p:clrMapOvr>
     <a:masterClrMapping/>
   </p:clrMapOvr>
-  <p:timing>
-    <p:tnLst>
-      <p:par>
-        <p:cTn id="1" dur="indefinite" restart="never" nodeType="tmRoot"/>
-      </p:par>
-    </p:tnLst>
-  </p:timing>
 </p:sld>
 </file>
 
-<file path=ppt/slides/slide11.xml><?xml version="1.0" encoding="utf-8"?>
+<file path=ppt/slides/slide15.xml><?xml version="1.0" encoding="utf-8"?>
+<p:sld xmlns:a="http://schemas.openxmlformats.org/drawingml/2006/main" xmlns:r="http://schemas.openxmlformats.org/officeDocument/2006/relationships" xmlns:p="http://schemas.openxmlformats.org/presentationml/2006/main">
+  <p:cSld>
+    <p:spTree>
+      <p:nvGrpSpPr>
+        <p:cNvPr id="1" name=""/>
+        <p:cNvGrpSpPr/>
+        <p:nvPr/>
+      </p:nvGrpSpPr>
+      <p:grpSpPr>
+        <a:xfrm>
+          <a:off x="0" y="0"/>
+          <a:ext cx="0" cy="0"/>
+          <a:chOff x="0" y="0"/>
+          <a:chExt cx="0" cy="0"/>
+        </a:xfrm>
+      </p:grpSpPr>
+      <p:sp>
+        <p:nvSpPr>
+          <p:cNvPr id="10" name="Title 1">
+            <a:extLst>
+              <a:ext uri="{FF2B5EF4-FFF2-40B4-BE49-F238E27FC236}">
+                <a16:creationId xmlns:a16="http://schemas.microsoft.com/office/drawing/2014/main" id="{A180088B-9D64-45ED-96E5-53A5580428BB}"/>
+              </a:ext>
+            </a:extLst>
+          </p:cNvPr>
+          <p:cNvSpPr txBox="1">
+            <a:spLocks/>
+          </p:cNvSpPr>
+          <p:nvPr/>
+        </p:nvSpPr>
+        <p:spPr bwMode="gray">
+          <a:xfrm>
+            <a:off x="6596585" y="943657"/>
+            <a:ext cx="5595415" cy="706964"/>
+          </a:xfrm>
+          <a:prstGeom prst="rect">
+            <a:avLst/>
+          </a:prstGeom>
+        </p:spPr>
+        <p:txBody>
+          <a:bodyPr vert="horz" lIns="91440" tIns="45720" rIns="91440" bIns="45720" rtlCol="0" anchor="ctr">
+            <a:noAutofit/>
+          </a:bodyPr>
+          <a:lstStyle>
+            <a:lvl1pPr algn="l" defTabSz="457200" rtl="0" eaLnBrk="1" latinLnBrk="0" hangingPunct="1">
+              <a:spcBef>
+                <a:spcPct val="0"/>
+              </a:spcBef>
+              <a:buNone/>
+              <a:defRPr sz="3600" b="0" i="0" kern="1200">
+                <a:solidFill>
+                  <a:schemeClr val="bg2"/>
+                </a:solidFill>
+                <a:latin typeface="+mj-lt"/>
+                <a:ea typeface="+mj-ea"/>
+                <a:cs typeface="+mj-cs"/>
+              </a:defRPr>
+            </a:lvl1pPr>
+            <a:lvl2pPr eaLnBrk="1" hangingPunct="1">
+              <a:defRPr>
+                <a:solidFill>
+                  <a:schemeClr val="tx2"/>
+                </a:solidFill>
+              </a:defRPr>
+            </a:lvl2pPr>
+            <a:lvl3pPr eaLnBrk="1" hangingPunct="1">
+              <a:defRPr>
+                <a:solidFill>
+                  <a:schemeClr val="tx2"/>
+                </a:solidFill>
+              </a:defRPr>
+            </a:lvl3pPr>
+            <a:lvl4pPr eaLnBrk="1" hangingPunct="1">
+              <a:defRPr>
+                <a:solidFill>
+                  <a:schemeClr val="tx2"/>
+                </a:solidFill>
+              </a:defRPr>
+            </a:lvl4pPr>
+            <a:lvl5pPr eaLnBrk="1" hangingPunct="1">
+              <a:defRPr>
+                <a:solidFill>
+                  <a:schemeClr val="tx2"/>
+                </a:solidFill>
+              </a:defRPr>
+            </a:lvl5pPr>
+            <a:lvl6pPr eaLnBrk="1" hangingPunct="1">
+              <a:defRPr>
+                <a:solidFill>
+                  <a:schemeClr val="tx2"/>
+                </a:solidFill>
+              </a:defRPr>
+            </a:lvl6pPr>
+            <a:lvl7pPr eaLnBrk="1" hangingPunct="1">
+              <a:defRPr>
+                <a:solidFill>
+                  <a:schemeClr val="tx2"/>
+                </a:solidFill>
+              </a:defRPr>
+            </a:lvl7pPr>
+            <a:lvl8pPr eaLnBrk="1" hangingPunct="1">
+              <a:defRPr>
+                <a:solidFill>
+                  <a:schemeClr val="tx2"/>
+                </a:solidFill>
+              </a:defRPr>
+            </a:lvl8pPr>
+            <a:lvl9pPr eaLnBrk="1" hangingPunct="1">
+              <a:defRPr>
+                <a:solidFill>
+                  <a:schemeClr val="tx2"/>
+                </a:solidFill>
+              </a:defRPr>
+            </a:lvl9pPr>
+          </a:lstStyle>
+          <a:p>
+            <a:r>
+              <a:rPr lang="fr-FR" dirty="0"/>
+              <a:t>ANOVA </a:t>
+            </a:r>
+            <a:br>
+              <a:rPr lang="fr-FR" dirty="0"/>
+            </a:br>
+            <a:r>
+              <a:rPr lang="fr-FR" dirty="0"/>
+              <a:t>Sucres et </a:t>
+            </a:r>
+            <a:r>
+              <a:rPr lang="fr-FR" dirty="0" err="1"/>
+              <a:t>Nutrigrade</a:t>
+            </a:r>
+            <a:endParaRPr lang="fr-FR" dirty="0"/>
+          </a:p>
+        </p:txBody>
+      </p:sp>
+      <p:pic>
+        <p:nvPicPr>
+          <p:cNvPr id="7" name="Image 6">
+            <a:extLst>
+              <a:ext uri="{FF2B5EF4-FFF2-40B4-BE49-F238E27FC236}">
+                <a16:creationId xmlns:a16="http://schemas.microsoft.com/office/drawing/2014/main" id="{567F8B99-7C3D-4532-B231-B371F2DECCCF}"/>
+              </a:ext>
+            </a:extLst>
+          </p:cNvPr>
+          <p:cNvPicPr>
+            <a:picLocks noChangeAspect="1"/>
+          </p:cNvPicPr>
+          <p:nvPr/>
+        </p:nvPicPr>
+        <p:blipFill>
+          <a:blip r:embed="rId2"/>
+          <a:stretch>
+            <a:fillRect/>
+          </a:stretch>
+        </p:blipFill>
+        <p:spPr>
+          <a:xfrm>
+            <a:off x="233362" y="474539"/>
+            <a:ext cx="6238875" cy="6086475"/>
+          </a:xfrm>
+          <a:prstGeom prst="rect">
+            <a:avLst/>
+          </a:prstGeom>
+        </p:spPr>
+      </p:pic>
+      <p:pic>
+        <p:nvPicPr>
+          <p:cNvPr id="12" name="Image 11">
+            <a:extLst>
+              <a:ext uri="{FF2B5EF4-FFF2-40B4-BE49-F238E27FC236}">
+                <a16:creationId xmlns:a16="http://schemas.microsoft.com/office/drawing/2014/main" id="{908E1969-B60D-433B-AD03-F68A21A439E5}"/>
+              </a:ext>
+            </a:extLst>
+          </p:cNvPr>
+          <p:cNvPicPr>
+            <a:picLocks noChangeAspect="1"/>
+          </p:cNvPicPr>
+          <p:nvPr/>
+        </p:nvPicPr>
+        <p:blipFill>
+          <a:blip r:embed="rId3"/>
+          <a:stretch>
+            <a:fillRect/>
+          </a:stretch>
+        </p:blipFill>
+        <p:spPr>
+          <a:xfrm>
+            <a:off x="6472237" y="2350778"/>
+            <a:ext cx="5400675" cy="771525"/>
+          </a:xfrm>
+          <a:prstGeom prst="rect">
+            <a:avLst/>
+          </a:prstGeom>
+        </p:spPr>
+      </p:pic>
+      <p:sp>
+        <p:nvSpPr>
+          <p:cNvPr id="13" name="ZoneTexte 12">
+            <a:extLst>
+              <a:ext uri="{FF2B5EF4-FFF2-40B4-BE49-F238E27FC236}">
+                <a16:creationId xmlns:a16="http://schemas.microsoft.com/office/drawing/2014/main" id="{25463E77-DEA4-499A-9A9E-13799C9F0567}"/>
+              </a:ext>
+            </a:extLst>
+          </p:cNvPr>
+          <p:cNvSpPr txBox="1"/>
+          <p:nvPr/>
+        </p:nvSpPr>
+        <p:spPr>
+          <a:xfrm>
+            <a:off x="6472237" y="3119666"/>
+            <a:ext cx="4909351" cy="1384995"/>
+          </a:xfrm>
+          <a:prstGeom prst="rect">
+            <a:avLst/>
+          </a:prstGeom>
+          <a:noFill/>
+        </p:spPr>
+        <p:txBody>
+          <a:bodyPr wrap="square" rtlCol="0">
+            <a:spAutoFit/>
+          </a:bodyPr>
+          <a:lstStyle/>
+          <a:p>
+            <a:pPr algn="l"/>
+            <a:r>
+              <a:rPr lang="fr-FR" sz="1400" b="0" i="0" dirty="0">
+                <a:solidFill>
+                  <a:srgbClr val="000000"/>
+                </a:solidFill>
+                <a:effectLst/>
+                <a:latin typeface="Helvetica Neue"/>
+              </a:rPr>
+              <a:t>Hypothèse nulle h0: Il n'y a pas de variation du taux moyen de sucres pour les différents </a:t>
+            </a:r>
+            <a:r>
+              <a:rPr lang="fr-FR" sz="1400" b="0" i="0" dirty="0" err="1">
+                <a:solidFill>
+                  <a:srgbClr val="000000"/>
+                </a:solidFill>
+                <a:effectLst/>
+                <a:latin typeface="Helvetica Neue"/>
+              </a:rPr>
+              <a:t>nutrigrades</a:t>
+            </a:r>
+            <a:r>
+              <a:rPr lang="fr-FR" sz="1400" b="0" i="0" dirty="0">
+                <a:solidFill>
+                  <a:srgbClr val="000000"/>
+                </a:solidFill>
+                <a:effectLst/>
+                <a:latin typeface="Helvetica Neue"/>
+              </a:rPr>
+              <a:t>.</a:t>
+            </a:r>
+          </a:p>
+          <a:p>
+            <a:pPr algn="l"/>
+            <a:endParaRPr lang="fr-FR" sz="1400" b="0" i="0" dirty="0">
+              <a:solidFill>
+                <a:srgbClr val="000000"/>
+              </a:solidFill>
+              <a:effectLst/>
+              <a:latin typeface="Helvetica Neue"/>
+            </a:endParaRPr>
+          </a:p>
+          <a:p>
+            <a:pPr algn="l"/>
+            <a:r>
+              <a:rPr lang="fr-FR" sz="1400" b="0" i="0" dirty="0">
+                <a:solidFill>
+                  <a:srgbClr val="000000"/>
+                </a:solidFill>
+                <a:effectLst/>
+                <a:latin typeface="Helvetica Neue"/>
+              </a:rPr>
+              <a:t>Hypothèse alternative: Il y a une variation du taux moyen de sucres pour les différents </a:t>
+            </a:r>
+            <a:r>
+              <a:rPr lang="fr-FR" sz="1400" b="0" i="0" dirty="0" err="1">
+                <a:solidFill>
+                  <a:srgbClr val="000000"/>
+                </a:solidFill>
+                <a:effectLst/>
+                <a:latin typeface="Helvetica Neue"/>
+              </a:rPr>
+              <a:t>nutrigrades</a:t>
+            </a:r>
+            <a:r>
+              <a:rPr lang="fr-FR" sz="1400" b="0" i="0" dirty="0">
+                <a:solidFill>
+                  <a:srgbClr val="000000"/>
+                </a:solidFill>
+                <a:effectLst/>
+                <a:latin typeface="Helvetica Neue"/>
+              </a:rPr>
+              <a:t>.</a:t>
+            </a:r>
+          </a:p>
+          <a:p>
+            <a:endParaRPr lang="fr-FR" sz="1400" dirty="0"/>
+          </a:p>
+        </p:txBody>
+      </p:sp>
+      <p:pic>
+        <p:nvPicPr>
+          <p:cNvPr id="15" name="Image 14">
+            <a:extLst>
+              <a:ext uri="{FF2B5EF4-FFF2-40B4-BE49-F238E27FC236}">
+                <a16:creationId xmlns:a16="http://schemas.microsoft.com/office/drawing/2014/main" id="{B1E3811B-A26E-4D61-924D-952999A1A7B4}"/>
+              </a:ext>
+            </a:extLst>
+          </p:cNvPr>
+          <p:cNvPicPr>
+            <a:picLocks noChangeAspect="1"/>
+          </p:cNvPicPr>
+          <p:nvPr/>
+        </p:nvPicPr>
+        <p:blipFill>
+          <a:blip r:embed="rId4"/>
+          <a:stretch>
+            <a:fillRect/>
+          </a:stretch>
+        </p:blipFill>
+        <p:spPr>
+          <a:xfrm>
+            <a:off x="7786687" y="4780362"/>
+            <a:ext cx="2771775" cy="752475"/>
+          </a:xfrm>
+          <a:prstGeom prst="rect">
+            <a:avLst/>
+          </a:prstGeom>
+        </p:spPr>
+      </p:pic>
+    </p:spTree>
+    <p:extLst>
+      <p:ext uri="{BB962C8B-B14F-4D97-AF65-F5344CB8AC3E}">
+        <p14:creationId xmlns:p14="http://schemas.microsoft.com/office/powerpoint/2010/main" val="2402970315"/>
+      </p:ext>
+    </p:extLst>
+  </p:cSld>
+  <p:clrMapOvr>
+    <a:masterClrMapping/>
+  </p:clrMapOvr>
+</p:sld>
+</file>
+
+<file path=ppt/slides/slide16.xml><?xml version="1.0" encoding="utf-8"?>
 <p:sld xmlns:a="http://schemas.openxmlformats.org/drawingml/2006/main" xmlns:r="http://schemas.openxmlformats.org/officeDocument/2006/relationships" xmlns:p="http://schemas.openxmlformats.org/presentationml/2006/main">
   <p:cSld>
     <p:spTree>
@@ -13549,17 +14740,10 @@
   <p:clrMapOvr>
     <a:masterClrMapping/>
   </p:clrMapOvr>
-  <p:timing>
-    <p:tnLst>
-      <p:par>
-        <p:cTn id="1" dur="indefinite" restart="never" nodeType="tmRoot"/>
-      </p:par>
-    </p:tnLst>
-  </p:timing>
 </p:sld>
 </file>
 
-<file path=ppt/slides/slide12.xml><?xml version="1.0" encoding="utf-8"?>
+<file path=ppt/slides/slide17.xml><?xml version="1.0" encoding="utf-8"?>
 <p:sld xmlns:a="http://schemas.openxmlformats.org/drawingml/2006/main" xmlns:r="http://schemas.openxmlformats.org/officeDocument/2006/relationships" xmlns:p="http://schemas.openxmlformats.org/presentationml/2006/main">
   <p:cSld>
     <p:spTree>
@@ -13597,12 +14781,8 @@
           <a:lstStyle/>
           <a:p>
             <a:r>
-              <a:rPr lang="fr-FR" b="1" dirty="0" smtClean="0"/>
+              <a:rPr lang="fr-FR" b="1" dirty="0"/>
               <a:t>Conclusion</a:t>
-            </a:r>
-            <a:r>
-              <a:rPr lang="fr-FR" b="1" dirty="0"/>
-              <a:t/>
             </a:r>
             <a:br>
               <a:rPr lang="fr-FR" b="1" dirty="0"/>
@@ -13627,10 +14807,9 @@
           <a:lstStyle/>
           <a:p>
             <a:r>
-              <a:rPr lang="fr-FR" dirty="0" smtClean="0"/>
+              <a:rPr lang="fr-FR" dirty="0"/>
               <a:t>Ingénieur IA – projet 3</a:t>
             </a:r>
-            <a:endParaRPr lang="fr-FR" dirty="0"/>
           </a:p>
         </p:txBody>
       </p:sp>
@@ -13644,13 +14823,6 @@
   <p:clrMapOvr>
     <a:masterClrMapping/>
   </p:clrMapOvr>
-  <p:timing>
-    <p:tnLst>
-      <p:par>
-        <p:cTn id="1" dur="indefinite" restart="never" nodeType="tmRoot"/>
-      </p:par>
-    </p:tnLst>
-  </p:timing>
 </p:sld>
 </file>
 
@@ -13687,10 +14859,9 @@
           <a:lstStyle/>
           <a:p>
             <a:r>
-              <a:rPr lang="fr-FR" dirty="0" smtClean="0"/>
+              <a:rPr lang="fr-FR" dirty="0"/>
               <a:t>Présentation du projet</a:t>
             </a:r>
-            <a:endParaRPr lang="fr-FR" dirty="0"/>
           </a:p>
         </p:txBody>
       </p:sp>
@@ -13788,13 +14959,6 @@
   <p:clrMapOvr>
     <a:masterClrMapping/>
   </p:clrMapOvr>
-  <p:timing>
-    <p:tnLst>
-      <p:par>
-        <p:cTn id="1" dur="indefinite" restart="never" nodeType="tmRoot"/>
-      </p:par>
-    </p:tnLst>
-  </p:timing>
 </p:sld>
 </file>
 
@@ -13831,10 +14995,9 @@
           <a:lstStyle/>
           <a:p>
             <a:r>
-              <a:rPr lang="fr-FR" dirty="0" smtClean="0"/>
+              <a:rPr lang="fr-FR" dirty="0"/>
               <a:t>Exploration préliminaire</a:t>
             </a:r>
-            <a:endParaRPr lang="fr-FR" dirty="0"/>
           </a:p>
         </p:txBody>
       </p:sp>
@@ -13864,7 +15027,13 @@
       </p:pic>
       <p:pic>
         <p:nvPicPr>
-          <p:cNvPr id="7" name="Picture 6"/>
+          <p:cNvPr id="5" name="Image 4">
+            <a:extLst>
+              <a:ext uri="{FF2B5EF4-FFF2-40B4-BE49-F238E27FC236}">
+                <a16:creationId xmlns:a16="http://schemas.microsoft.com/office/drawing/2014/main" id="{6F1DB94A-F41F-414E-89D3-2D45C826156C}"/>
+              </a:ext>
+            </a:extLst>
+          </p:cNvPr>
           <p:cNvPicPr>
             <a:picLocks noChangeAspect="1"/>
           </p:cNvPicPr>
@@ -13878,8 +15047,8 @@
         </p:blipFill>
         <p:spPr>
           <a:xfrm>
-            <a:off x="1406999" y="2911288"/>
-            <a:ext cx="3905250" cy="3505200"/>
+            <a:off x="1290545" y="2911288"/>
+            <a:ext cx="4086752" cy="3608574"/>
           </a:xfrm>
           <a:prstGeom prst="rect">
             <a:avLst/>
@@ -13888,7 +15057,13 @@
       </p:pic>
       <p:pic>
         <p:nvPicPr>
-          <p:cNvPr id="8" name="Picture 7"/>
+          <p:cNvPr id="9" name="Image 8">
+            <a:extLst>
+              <a:ext uri="{FF2B5EF4-FFF2-40B4-BE49-F238E27FC236}">
+                <a16:creationId xmlns:a16="http://schemas.microsoft.com/office/drawing/2014/main" id="{A00BA3E3-C571-4578-8A3E-269EF46AD62F}"/>
+              </a:ext>
+            </a:extLst>
+          </p:cNvPr>
           <p:cNvPicPr>
             <a:picLocks noChangeAspect="1"/>
           </p:cNvPicPr>
@@ -13902,8 +15077,8 @@
         </p:blipFill>
         <p:spPr>
           <a:xfrm>
-            <a:off x="6077792" y="2911288"/>
-            <a:ext cx="3838575" cy="3400425"/>
+            <a:off x="6096000" y="2911288"/>
+            <a:ext cx="4086752" cy="3479415"/>
           </a:xfrm>
           <a:prstGeom prst="rect">
             <a:avLst/>
@@ -13920,13 +15095,6 @@
   <p:clrMapOvr>
     <a:masterClrMapping/>
   </p:clrMapOvr>
-  <p:timing>
-    <p:tnLst>
-      <p:par>
-        <p:cTn id="1" dur="indefinite" restart="never" nodeType="tmRoot"/>
-      </p:par>
-    </p:tnLst>
-  </p:timing>
 </p:sld>
 </file>
 
@@ -13963,10 +15131,9 @@
           <a:lstStyle/>
           <a:p>
             <a:r>
-              <a:rPr lang="fr-FR" dirty="0" smtClean="0"/>
+              <a:rPr lang="fr-FR" dirty="0"/>
               <a:t>Nettoyage des données</a:t>
             </a:r>
-            <a:endParaRPr lang="fr-FR" dirty="0"/>
           </a:p>
         </p:txBody>
       </p:sp>
@@ -13991,29 +15158,25 @@
           <a:lstStyle/>
           <a:p>
             <a:r>
-              <a:rPr lang="fr-FR" dirty="0" smtClean="0"/>
+              <a:rPr lang="fr-FR" dirty="0"/>
               <a:t>1) Exclusion des données inexploitables</a:t>
             </a:r>
           </a:p>
           <a:p>
-            <a:endParaRPr lang="fr-FR" dirty="0" smtClean="0"/>
+            <a:endParaRPr lang="fr-FR" dirty="0"/>
           </a:p>
           <a:p>
             <a:r>
               <a:rPr lang="fr-FR" dirty="0"/>
-              <a:t>2</a:t>
+              <a:t>2) Remplacement des valeurs aberrantes des variables quantitatives</a:t>
             </a:r>
+          </a:p>
+          <a:p>
+            <a:endParaRPr lang="fr-FR" dirty="0"/>
+          </a:p>
+          <a:p>
             <a:r>
-              <a:rPr lang="fr-FR" dirty="0" smtClean="0"/>
-              <a:t>) Remplacement des valeurs aberrantes des variables quantitatives</a:t>
-            </a:r>
-          </a:p>
-          <a:p>
-            <a:endParaRPr lang="fr-FR" dirty="0" smtClean="0"/>
-          </a:p>
-          <a:p>
-            <a:r>
-              <a:rPr lang="fr-FR" dirty="0" smtClean="0"/>
+              <a:rPr lang="fr-FR" dirty="0"/>
               <a:t>3) Exclusion des colonnes comportant trop de valeurs manquantes</a:t>
             </a:r>
           </a:p>
@@ -14022,10 +15185,9 @@
           </a:p>
           <a:p>
             <a:r>
-              <a:rPr lang="fr-FR" dirty="0" smtClean="0"/>
+              <a:rPr lang="fr-FR" dirty="0"/>
               <a:t>4) Suppression des doublons</a:t>
             </a:r>
-            <a:endParaRPr lang="fr-FR" dirty="0"/>
           </a:p>
         </p:txBody>
       </p:sp>
@@ -14039,13 +15201,6 @@
   <p:clrMapOvr>
     <a:masterClrMapping/>
   </p:clrMapOvr>
-  <p:timing>
-    <p:tnLst>
-      <p:par>
-        <p:cTn id="1" dur="indefinite" restart="never" nodeType="tmRoot"/>
-      </p:par>
-    </p:tnLst>
-  </p:timing>
 </p:sld>
 </file>
 
@@ -14082,10 +15237,9 @@
           <a:lstStyle/>
           <a:p>
             <a:r>
-              <a:rPr lang="fr-FR" dirty="0" smtClean="0"/>
+              <a:rPr lang="fr-FR" dirty="0"/>
               <a:t>Bilan du nettoyage </a:t>
             </a:r>
-            <a:endParaRPr lang="fr-FR" dirty="0"/>
           </a:p>
         </p:txBody>
       </p:sp>
@@ -14115,7 +15269,7 @@
       </p:pic>
       <p:pic>
         <p:nvPicPr>
-          <p:cNvPr id="5" name="Picture 4"/>
+          <p:cNvPr id="8" name="Picture 7"/>
           <p:cNvPicPr>
             <a:picLocks noChangeAspect="1"/>
           </p:cNvPicPr>
@@ -14129,55 +15283,7 @@
         </p:blipFill>
         <p:spPr>
           <a:xfrm>
-            <a:off x="518970" y="2918061"/>
-            <a:ext cx="3733800" cy="3457575"/>
-          </a:xfrm>
-          <a:prstGeom prst="rect">
-            <a:avLst/>
-          </a:prstGeom>
-        </p:spPr>
-      </p:pic>
-      <p:pic>
-        <p:nvPicPr>
-          <p:cNvPr id="6" name="Picture 5"/>
-          <p:cNvPicPr>
-            <a:picLocks noChangeAspect="1"/>
-          </p:cNvPicPr>
-          <p:nvPr/>
-        </p:nvPicPr>
-        <p:blipFill>
-          <a:blip r:embed="rId4"/>
-          <a:stretch>
-            <a:fillRect/>
-          </a:stretch>
-        </p:blipFill>
-        <p:spPr>
-          <a:xfrm>
-            <a:off x="4313248" y="2889486"/>
-            <a:ext cx="3905250" cy="3486150"/>
-          </a:xfrm>
-          <a:prstGeom prst="rect">
-            <a:avLst/>
-          </a:prstGeom>
-        </p:spPr>
-      </p:pic>
-      <p:pic>
-        <p:nvPicPr>
-          <p:cNvPr id="8" name="Picture 7"/>
-          <p:cNvPicPr>
-            <a:picLocks noChangeAspect="1"/>
-          </p:cNvPicPr>
-          <p:nvPr/>
-        </p:nvPicPr>
-        <p:blipFill>
-          <a:blip r:embed="rId5"/>
-          <a:stretch>
-            <a:fillRect/>
-          </a:stretch>
-        </p:blipFill>
-        <p:spPr>
-          <a:xfrm>
-            <a:off x="8954342" y="3166485"/>
+            <a:off x="8954342" y="3175363"/>
             <a:ext cx="1924050" cy="2762250"/>
           </a:xfrm>
           <a:prstGeom prst="rect">
@@ -14193,7 +15299,7 @@
         </p:nvSpPr>
         <p:spPr>
           <a:xfrm>
-            <a:off x="8343462" y="2889486"/>
+            <a:off x="8343462" y="2907242"/>
             <a:ext cx="3145810" cy="276999"/>
           </a:xfrm>
           <a:prstGeom prst="rect">
@@ -14208,13 +15314,72 @@
           <a:lstStyle/>
           <a:p>
             <a:r>
-              <a:rPr lang="fr-FR" sz="1200" dirty="0" smtClean="0"/>
+              <a:rPr lang="fr-FR" sz="1200" dirty="0"/>
               <a:t>Données manquantes après traitement</a:t>
             </a:r>
-            <a:endParaRPr lang="fr-FR" sz="1200" dirty="0"/>
           </a:p>
         </p:txBody>
       </p:sp>
+      <p:pic>
+        <p:nvPicPr>
+          <p:cNvPr id="7" name="Image 6">
+            <a:extLst>
+              <a:ext uri="{FF2B5EF4-FFF2-40B4-BE49-F238E27FC236}">
+                <a16:creationId xmlns:a16="http://schemas.microsoft.com/office/drawing/2014/main" id="{3078D3F9-FAE4-468A-A1C2-FF1DFBEBF6DF}"/>
+              </a:ext>
+            </a:extLst>
+          </p:cNvPr>
+          <p:cNvPicPr>
+            <a:picLocks noChangeAspect="1"/>
+          </p:cNvPicPr>
+          <p:nvPr/>
+        </p:nvPicPr>
+        <p:blipFill>
+          <a:blip r:embed="rId4"/>
+          <a:stretch>
+            <a:fillRect/>
+          </a:stretch>
+        </p:blipFill>
+        <p:spPr>
+          <a:xfrm>
+            <a:off x="373209" y="2889486"/>
+            <a:ext cx="3940039" cy="3649426"/>
+          </a:xfrm>
+          <a:prstGeom prst="rect">
+            <a:avLst/>
+          </a:prstGeom>
+        </p:spPr>
+      </p:pic>
+      <p:pic>
+        <p:nvPicPr>
+          <p:cNvPr id="11" name="Image 10">
+            <a:extLst>
+              <a:ext uri="{FF2B5EF4-FFF2-40B4-BE49-F238E27FC236}">
+                <a16:creationId xmlns:a16="http://schemas.microsoft.com/office/drawing/2014/main" id="{DCB87FCD-8460-403C-8573-CF4F212CBE40}"/>
+              </a:ext>
+            </a:extLst>
+          </p:cNvPr>
+          <p:cNvPicPr>
+            <a:picLocks noChangeAspect="1"/>
+          </p:cNvPicPr>
+          <p:nvPr/>
+        </p:nvPicPr>
+        <p:blipFill>
+          <a:blip r:embed="rId5"/>
+          <a:stretch>
+            <a:fillRect/>
+          </a:stretch>
+        </p:blipFill>
+        <p:spPr>
+          <a:xfrm>
+            <a:off x="4314349" y="2889486"/>
+            <a:ext cx="4068331" cy="3518405"/>
+          </a:xfrm>
+          <a:prstGeom prst="rect">
+            <a:avLst/>
+          </a:prstGeom>
+        </p:spPr>
+      </p:pic>
     </p:spTree>
     <p:extLst>
       <p:ext uri="{BB962C8B-B14F-4D97-AF65-F5344CB8AC3E}">
@@ -14225,13 +15390,6 @@
   <p:clrMapOvr>
     <a:masterClrMapping/>
   </p:clrMapOvr>
-  <p:timing>
-    <p:tnLst>
-      <p:par>
-        <p:cTn id="1" dur="indefinite" restart="never" nodeType="tmRoot"/>
-      </p:par>
-    </p:tnLst>
-  </p:timing>
 </p:sld>
 </file>
 
@@ -14268,10 +15426,9 @@
           <a:lstStyle/>
           <a:p>
             <a:r>
-              <a:rPr lang="fr-FR" dirty="0" smtClean="0"/>
+              <a:rPr lang="fr-FR" dirty="0"/>
               <a:t>Analyse des données</a:t>
             </a:r>
-            <a:endParaRPr lang="fr-FR" dirty="0"/>
           </a:p>
         </p:txBody>
       </p:sp>
@@ -14296,7 +15453,7 @@
           <a:lstStyle/>
           <a:p>
             <a:r>
-              <a:rPr lang="fr-FR" dirty="0" smtClean="0"/>
+              <a:rPr lang="fr-FR" dirty="0"/>
               <a:t>1) Analyse en Composantes Principales des nutriments</a:t>
             </a:r>
           </a:p>
@@ -14305,7 +15462,7 @@
           </a:p>
           <a:p>
             <a:r>
-              <a:rPr lang="fr-FR" dirty="0" smtClean="0"/>
+              <a:rPr lang="fr-FR" dirty="0"/>
               <a:t>2) Analyse de variance entre nutriments et nutriscore</a:t>
             </a:r>
           </a:p>
@@ -14314,10 +15471,9 @@
           </a:p>
           <a:p>
             <a:r>
-              <a:rPr lang="fr-FR" dirty="0" smtClean="0"/>
+              <a:rPr lang="fr-FR" dirty="0"/>
               <a:t>3) Analyse qualitative des marques les plus représentées</a:t>
             </a:r>
-            <a:endParaRPr lang="fr-FR" dirty="0"/>
           </a:p>
         </p:txBody>
       </p:sp>
@@ -14331,17 +15487,128 @@
   <p:clrMapOvr>
     <a:masterClrMapping/>
   </p:clrMapOvr>
-  <p:timing>
-    <p:tnLst>
-      <p:par>
-        <p:cTn id="1" dur="indefinite" restart="never" nodeType="tmRoot"/>
-      </p:par>
-    </p:tnLst>
-  </p:timing>
 </p:sld>
 </file>
 
 <file path=ppt/slides/slide7.xml><?xml version="1.0" encoding="utf-8"?>
+<p:sld xmlns:a="http://schemas.openxmlformats.org/drawingml/2006/main" xmlns:r="http://schemas.openxmlformats.org/officeDocument/2006/relationships" xmlns:p="http://schemas.openxmlformats.org/presentationml/2006/main">
+  <p:cSld>
+    <p:spTree>
+      <p:nvGrpSpPr>
+        <p:cNvPr id="1" name=""/>
+        <p:cNvGrpSpPr/>
+        <p:nvPr/>
+      </p:nvGrpSpPr>
+      <p:grpSpPr>
+        <a:xfrm>
+          <a:off x="0" y="0"/>
+          <a:ext cx="0" cy="0"/>
+          <a:chOff x="0" y="0"/>
+          <a:chExt cx="0" cy="0"/>
+        </a:xfrm>
+      </p:grpSpPr>
+      <p:sp>
+        <p:nvSpPr>
+          <p:cNvPr id="2" name="Titre 1">
+            <a:extLst>
+              <a:ext uri="{FF2B5EF4-FFF2-40B4-BE49-F238E27FC236}">
+                <a16:creationId xmlns:a16="http://schemas.microsoft.com/office/drawing/2014/main" id="{E22B11BB-691D-40E5-A7DD-82FB58BADB16}"/>
+              </a:ext>
+            </a:extLst>
+          </p:cNvPr>
+          <p:cNvSpPr>
+            <a:spLocks noGrp="1"/>
+          </p:cNvSpPr>
+          <p:nvPr>
+            <p:ph type="title"/>
+          </p:nvPr>
+        </p:nvSpPr>
+        <p:spPr/>
+        <p:txBody>
+          <a:bodyPr/>
+          <a:lstStyle/>
+          <a:p>
+            <a:r>
+              <a:rPr lang="fr-FR" dirty="0"/>
+              <a:t>Analyse en Composantes Principales: Méthodologie</a:t>
+            </a:r>
+          </a:p>
+        </p:txBody>
+      </p:sp>
+      <p:pic>
+        <p:nvPicPr>
+          <p:cNvPr id="5" name="Image 4">
+            <a:extLst>
+              <a:ext uri="{FF2B5EF4-FFF2-40B4-BE49-F238E27FC236}">
+                <a16:creationId xmlns:a16="http://schemas.microsoft.com/office/drawing/2014/main" id="{8A1DEC80-C323-4D45-A931-A4A791F3809F}"/>
+              </a:ext>
+            </a:extLst>
+          </p:cNvPr>
+          <p:cNvPicPr>
+            <a:picLocks noChangeAspect="1"/>
+          </p:cNvPicPr>
+          <p:nvPr/>
+        </p:nvPicPr>
+        <p:blipFill>
+          <a:blip r:embed="rId2"/>
+          <a:stretch>
+            <a:fillRect/>
+          </a:stretch>
+        </p:blipFill>
+        <p:spPr>
+          <a:xfrm>
+            <a:off x="693059" y="2388093"/>
+            <a:ext cx="5626036" cy="3713316"/>
+          </a:xfrm>
+          <a:prstGeom prst="rect">
+            <a:avLst/>
+          </a:prstGeom>
+        </p:spPr>
+      </p:pic>
+      <p:pic>
+        <p:nvPicPr>
+          <p:cNvPr id="9" name="Image 8">
+            <a:extLst>
+              <a:ext uri="{FF2B5EF4-FFF2-40B4-BE49-F238E27FC236}">
+                <a16:creationId xmlns:a16="http://schemas.microsoft.com/office/drawing/2014/main" id="{721B314B-977D-4D76-9F29-A14EA0858AFC}"/>
+              </a:ext>
+            </a:extLst>
+          </p:cNvPr>
+          <p:cNvPicPr>
+            <a:picLocks noChangeAspect="1"/>
+          </p:cNvPicPr>
+          <p:nvPr/>
+        </p:nvPicPr>
+        <p:blipFill>
+          <a:blip r:embed="rId3"/>
+          <a:stretch>
+            <a:fillRect/>
+          </a:stretch>
+        </p:blipFill>
+        <p:spPr>
+          <a:xfrm>
+            <a:off x="6394281" y="2388094"/>
+            <a:ext cx="5123626" cy="3713316"/>
+          </a:xfrm>
+          <a:prstGeom prst="rect">
+            <a:avLst/>
+          </a:prstGeom>
+        </p:spPr>
+      </p:pic>
+    </p:spTree>
+    <p:extLst>
+      <p:ext uri="{BB962C8B-B14F-4D97-AF65-F5344CB8AC3E}">
+        <p14:creationId xmlns:p14="http://schemas.microsoft.com/office/powerpoint/2010/main" val="275359375"/>
+      </p:ext>
+    </p:extLst>
+  </p:cSld>
+  <p:clrMapOvr>
+    <a:masterClrMapping/>
+  </p:clrMapOvr>
+</p:sld>
+</file>
+
+<file path=ppt/slides/slide8.xml><?xml version="1.0" encoding="utf-8"?>
 <p:sld xmlns:a="http://schemas.openxmlformats.org/drawingml/2006/main" xmlns:r="http://schemas.openxmlformats.org/officeDocument/2006/relationships" xmlns:p="http://schemas.openxmlformats.org/presentationml/2006/main">
   <p:cSld>
     <p:spTree>
@@ -14374,10 +15641,9 @@
           <a:lstStyle/>
           <a:p>
             <a:r>
-              <a:rPr lang="fr-FR" dirty="0" smtClean="0"/>
+              <a:rPr lang="fr-FR" dirty="0"/>
               <a:t>Analyse en Composantes Principales</a:t>
             </a:r>
-            <a:endParaRPr lang="fr-FR" dirty="0"/>
           </a:p>
         </p:txBody>
       </p:sp>
@@ -14405,10 +15671,9 @@
               <a:buNone/>
             </a:pPr>
             <a:r>
-              <a:rPr lang="fr-FR" dirty="0" smtClean="0"/>
+              <a:rPr lang="fr-FR" dirty="0"/>
               <a:t>I) Matrice de corrélation bivariée</a:t>
             </a:r>
-            <a:endParaRPr lang="fr-FR" dirty="0"/>
           </a:p>
         </p:txBody>
       </p:sp>
@@ -14446,151 +15711,6 @@
   <p:clrMapOvr>
     <a:masterClrMapping/>
   </p:clrMapOvr>
-  <p:timing>
-    <p:tnLst>
-      <p:par>
-        <p:cTn id="1" dur="indefinite" restart="never" nodeType="tmRoot"/>
-      </p:par>
-    </p:tnLst>
-  </p:timing>
-</p:sld>
-</file>
-
-<file path=ppt/slides/slide8.xml><?xml version="1.0" encoding="utf-8"?>
-<p:sld xmlns:a="http://schemas.openxmlformats.org/drawingml/2006/main" xmlns:r="http://schemas.openxmlformats.org/officeDocument/2006/relationships" xmlns:p="http://schemas.openxmlformats.org/presentationml/2006/main">
-  <p:cSld>
-    <p:spTree>
-      <p:nvGrpSpPr>
-        <p:cNvPr id="1" name=""/>
-        <p:cNvGrpSpPr/>
-        <p:nvPr/>
-      </p:nvGrpSpPr>
-      <p:grpSpPr>
-        <a:xfrm>
-          <a:off x="0" y="0"/>
-          <a:ext cx="0" cy="0"/>
-          <a:chOff x="0" y="0"/>
-          <a:chExt cx="0" cy="0"/>
-        </a:xfrm>
-      </p:grpSpPr>
-      <p:sp>
-        <p:nvSpPr>
-          <p:cNvPr id="2" name="Title 1"/>
-          <p:cNvSpPr>
-            <a:spLocks noGrp="1"/>
-          </p:cNvSpPr>
-          <p:nvPr>
-            <p:ph type="title"/>
-          </p:nvPr>
-        </p:nvSpPr>
-        <p:spPr/>
-        <p:txBody>
-          <a:bodyPr/>
-          <a:lstStyle/>
-          <a:p>
-            <a:r>
-              <a:rPr lang="fr-FR" dirty="0"/>
-              <a:t>Analyse en Composantes Principales</a:t>
-            </a:r>
-          </a:p>
-        </p:txBody>
-      </p:sp>
-      <p:sp>
-        <p:nvSpPr>
-          <p:cNvPr id="3" name="Content Placeholder 2"/>
-          <p:cNvSpPr>
-            <a:spLocks noGrp="1"/>
-          </p:cNvSpPr>
-          <p:nvPr>
-            <p:ph idx="1"/>
-          </p:nvPr>
-        </p:nvSpPr>
-        <p:spPr>
-          <a:xfrm>
-            <a:off x="1215920" y="2460198"/>
-            <a:ext cx="1649661" cy="494542"/>
-          </a:xfrm>
-        </p:spPr>
-        <p:txBody>
-          <a:bodyPr/>
-          <a:lstStyle/>
-          <a:p>
-            <a:pPr marL="0" indent="0">
-              <a:buNone/>
-            </a:pPr>
-            <a:r>
-              <a:rPr lang="fr-FR" dirty="0" smtClean="0"/>
-              <a:t>II) Résultats</a:t>
-            </a:r>
-            <a:endParaRPr lang="fr-FR" dirty="0"/>
-          </a:p>
-        </p:txBody>
-      </p:sp>
-      <p:pic>
-        <p:nvPicPr>
-          <p:cNvPr id="4" name="Picture 3"/>
-          <p:cNvPicPr>
-            <a:picLocks noChangeAspect="1"/>
-          </p:cNvPicPr>
-          <p:nvPr/>
-        </p:nvPicPr>
-        <p:blipFill>
-          <a:blip r:embed="rId2"/>
-          <a:stretch>
-            <a:fillRect/>
-          </a:stretch>
-        </p:blipFill>
-        <p:spPr>
-          <a:xfrm>
-            <a:off x="935013" y="3022979"/>
-            <a:ext cx="4639717" cy="2940666"/>
-          </a:xfrm>
-          <a:prstGeom prst="rect">
-            <a:avLst/>
-          </a:prstGeom>
-        </p:spPr>
-      </p:pic>
-      <p:pic>
-        <p:nvPicPr>
-          <p:cNvPr id="5" name="Picture 4"/>
-          <p:cNvPicPr>
-            <a:picLocks noChangeAspect="1"/>
-          </p:cNvPicPr>
-          <p:nvPr/>
-        </p:nvPicPr>
-        <p:blipFill>
-          <a:blip r:embed="rId3"/>
-          <a:stretch>
-            <a:fillRect/>
-          </a:stretch>
-        </p:blipFill>
-        <p:spPr>
-          <a:xfrm>
-            <a:off x="6090739" y="2157984"/>
-            <a:ext cx="5195959" cy="4102073"/>
-          </a:xfrm>
-          <a:prstGeom prst="rect">
-            <a:avLst/>
-          </a:prstGeom>
-        </p:spPr>
-      </p:pic>
-    </p:spTree>
-    <p:extLst>
-      <p:ext uri="{BB962C8B-B14F-4D97-AF65-F5344CB8AC3E}">
-        <p14:creationId xmlns:p14="http://schemas.microsoft.com/office/powerpoint/2010/main" val="2561066553"/>
-      </p:ext>
-    </p:extLst>
-  </p:cSld>
-  <p:clrMapOvr>
-    <a:masterClrMapping/>
-  </p:clrMapOvr>
-  <p:timing>
-    <p:tnLst>
-      <p:par>
-        <p:cTn id="1" dur="indefinite" restart="never" nodeType="tmRoot"/>
-      </p:par>
-    </p:tnLst>
-  </p:timing>
 </p:sld>
 </file>
 
@@ -14645,8 +15765,8 @@
         </p:nvSpPr>
         <p:spPr>
           <a:xfrm>
-            <a:off x="657649" y="6001792"/>
-            <a:ext cx="5191254" cy="856208"/>
+            <a:off x="1215920" y="2460198"/>
+            <a:ext cx="1649661" cy="494542"/>
           </a:xfrm>
         </p:spPr>
         <p:txBody>
@@ -14657,25 +15777,15 @@
               <a:buNone/>
             </a:pPr>
             <a:r>
-              <a:rPr lang="fr-FR" dirty="0" smtClean="0"/>
-              <a:t>III) ACP sur un nombre </a:t>
+              <a:rPr lang="fr-FR" dirty="0"/>
+              <a:t>II) Résultats</a:t>
             </a:r>
-            <a:r>
-              <a:rPr lang="fr-FR" dirty="0"/>
-              <a:t>réduit de variables</a:t>
-            </a:r>
-          </a:p>
-          <a:p>
-            <a:pPr marL="0" indent="0">
-              <a:buNone/>
-            </a:pPr>
-            <a:endParaRPr lang="fr-FR" dirty="0"/>
           </a:p>
         </p:txBody>
       </p:sp>
       <p:pic>
         <p:nvPicPr>
-          <p:cNvPr id="5" name="Picture 4"/>
+          <p:cNvPr id="4" name="Picture 3"/>
           <p:cNvPicPr>
             <a:picLocks noChangeAspect="1"/>
           </p:cNvPicPr>
@@ -14689,8 +15799,8 @@
         </p:blipFill>
         <p:spPr>
           <a:xfrm>
-            <a:off x="5848903" y="1792179"/>
-            <a:ext cx="5417324" cy="4353801"/>
+            <a:off x="719091" y="2886127"/>
+            <a:ext cx="4855639" cy="3077518"/>
           </a:xfrm>
           <a:prstGeom prst="rect">
             <a:avLst/>
@@ -14699,7 +15809,7 @@
       </p:pic>
       <p:pic>
         <p:nvPicPr>
-          <p:cNvPr id="6" name="Picture 5"/>
+          <p:cNvPr id="5" name="Picture 4"/>
           <p:cNvPicPr>
             <a:picLocks noChangeAspect="1"/>
           </p:cNvPicPr>
@@ -14713,8 +15823,8 @@
         </p:blipFill>
         <p:spPr>
           <a:xfrm>
-            <a:off x="349737" y="2165158"/>
-            <a:ext cx="5399058" cy="3607841"/>
+            <a:off x="5850386" y="1999069"/>
+            <a:ext cx="5498458" cy="4340888"/>
           </a:xfrm>
           <a:prstGeom prst="rect">
             <a:avLst/>
@@ -14724,20 +15834,13 @@
     </p:spTree>
     <p:extLst>
       <p:ext uri="{BB962C8B-B14F-4D97-AF65-F5344CB8AC3E}">
-        <p14:creationId xmlns:p14="http://schemas.microsoft.com/office/powerpoint/2010/main" val="1258370652"/>
+        <p14:creationId xmlns:p14="http://schemas.microsoft.com/office/powerpoint/2010/main" val="2561066553"/>
       </p:ext>
     </p:extLst>
   </p:cSld>
   <p:clrMapOvr>
     <a:masterClrMapping/>
   </p:clrMapOvr>
-  <p:timing>
-    <p:tnLst>
-      <p:par>
-        <p:cTn id="1" dur="indefinite" restart="never" nodeType="tmRoot"/>
-      </p:par>
-    </p:tnLst>
-  </p:timing>
 </p:sld>
 </file>
 

</xml_diff>